<commit_message>
slides review for 2019-fall semester
</commit_message>
<xml_diff>
--- a/Labs/Lab05-LCD/Lab05-LCD.pptx
+++ b/Labs/Lab05-LCD/Lab05-LCD.pptx
@@ -7,23 +7,24 @@
   <p:sldIdLst>
     <p:sldId id="256" r:id="rId2"/>
     <p:sldId id="257" r:id="rId3"/>
-    <p:sldId id="258" r:id="rId4"/>
-    <p:sldId id="279" r:id="rId5"/>
-    <p:sldId id="280" r:id="rId6"/>
-    <p:sldId id="281" r:id="rId7"/>
-    <p:sldId id="259" r:id="rId8"/>
-    <p:sldId id="260" r:id="rId9"/>
-    <p:sldId id="261" r:id="rId10"/>
-    <p:sldId id="262" r:id="rId11"/>
-    <p:sldId id="265" r:id="rId12"/>
-    <p:sldId id="264" r:id="rId13"/>
-    <p:sldId id="266" r:id="rId14"/>
-    <p:sldId id="273" r:id="rId15"/>
-    <p:sldId id="267" r:id="rId16"/>
-    <p:sldId id="275" r:id="rId17"/>
-    <p:sldId id="276" r:id="rId18"/>
-    <p:sldId id="277" r:id="rId19"/>
-    <p:sldId id="278" r:id="rId20"/>
+    <p:sldId id="314" r:id="rId4"/>
+    <p:sldId id="258" r:id="rId5"/>
+    <p:sldId id="279" r:id="rId6"/>
+    <p:sldId id="280" r:id="rId7"/>
+    <p:sldId id="281" r:id="rId8"/>
+    <p:sldId id="259" r:id="rId9"/>
+    <p:sldId id="260" r:id="rId10"/>
+    <p:sldId id="261" r:id="rId11"/>
+    <p:sldId id="262" r:id="rId12"/>
+    <p:sldId id="265" r:id="rId13"/>
+    <p:sldId id="264" r:id="rId14"/>
+    <p:sldId id="266" r:id="rId15"/>
+    <p:sldId id="273" r:id="rId16"/>
+    <p:sldId id="267" r:id="rId17"/>
+    <p:sldId id="275" r:id="rId18"/>
+    <p:sldId id="276" r:id="rId19"/>
+    <p:sldId id="277" r:id="rId20"/>
+    <p:sldId id="278" r:id="rId21"/>
   </p:sldIdLst>
   <p:sldSz cx="9144000" cy="6858000" type="screen4x3"/>
   <p:notesSz cx="6858000" cy="9144000"/>
@@ -503,10 +504,9 @@
           </a:lstStyle>
           <a:p>
             <a:r>
-              <a:rPr lang="zh-TW" altLang="en-US" smtClean="0"/>
+              <a:rPr lang="zh-TW" altLang="en-US"/>
               <a:t>按一下以編輯母片標題樣式</a:t>
             </a:r>
-            <a:endParaRPr lang="zh-TW" altLang="en-US"/>
           </a:p>
         </p:txBody>
       </p:sp>
@@ -540,10 +540,9 @@
           </a:lstStyle>
           <a:p>
             <a:r>
-              <a:rPr lang="zh-TW" altLang="en-US" smtClean="0"/>
+              <a:rPr lang="zh-TW" altLang="en-US"/>
               <a:t>按一下以編輯母片副標題樣式</a:t>
             </a:r>
-            <a:endParaRPr lang="zh-TW" altLang="en-US"/>
           </a:p>
         </p:txBody>
       </p:sp>
@@ -579,7 +578,7 @@
           <a:p>
             <a:fld id="{28320CCE-C547-4A70-B16F-104818F71F93}" type="datetimeFigureOut">
               <a:rPr lang="zh-TW" altLang="en-US" smtClean="0"/>
-              <a:t>2018/11/28</a:t>
+              <a:t>2019/12/5</a:t>
             </a:fld>
             <a:endParaRPr lang="zh-TW" altLang="en-US"/>
           </a:p>
@@ -703,10 +702,9 @@
           <a:lstStyle/>
           <a:p>
             <a:r>
-              <a:rPr lang="zh-TW" altLang="en-US" smtClean="0"/>
+              <a:rPr lang="zh-TW" altLang="en-US"/>
               <a:t>按一下以編輯母片標題樣式</a:t>
             </a:r>
-            <a:endParaRPr lang="zh-TW" altLang="en-US"/>
           </a:p>
         </p:txBody>
       </p:sp>
@@ -727,38 +725,37 @@
           <a:p>
             <a:pPr lvl="0"/>
             <a:r>
-              <a:rPr lang="zh-TW" altLang="en-US" smtClean="0"/>
+              <a:rPr lang="zh-TW" altLang="en-US"/>
               <a:t>按一下以編輯母片文字樣式</a:t>
             </a:r>
           </a:p>
           <a:p>
             <a:pPr lvl="1"/>
             <a:r>
-              <a:rPr lang="zh-TW" altLang="en-US" smtClean="0"/>
+              <a:rPr lang="zh-TW" altLang="en-US"/>
               <a:t>第二層</a:t>
             </a:r>
           </a:p>
           <a:p>
             <a:pPr lvl="2"/>
             <a:r>
-              <a:rPr lang="zh-TW" altLang="en-US" smtClean="0"/>
+              <a:rPr lang="zh-TW" altLang="en-US"/>
               <a:t>第三層</a:t>
             </a:r>
           </a:p>
           <a:p>
             <a:pPr lvl="3"/>
             <a:r>
-              <a:rPr lang="zh-TW" altLang="en-US" smtClean="0"/>
+              <a:rPr lang="zh-TW" altLang="en-US"/>
               <a:t>第四層</a:t>
             </a:r>
           </a:p>
           <a:p>
             <a:pPr lvl="4"/>
             <a:r>
-              <a:rPr lang="zh-TW" altLang="en-US" smtClean="0"/>
+              <a:rPr lang="zh-TW" altLang="en-US"/>
               <a:t>第五層</a:t>
             </a:r>
-            <a:endParaRPr lang="zh-TW" altLang="en-US"/>
           </a:p>
         </p:txBody>
       </p:sp>
@@ -783,7 +780,7 @@
           <a:p>
             <a:fld id="{28320CCE-C547-4A70-B16F-104818F71F93}" type="datetimeFigureOut">
               <a:rPr lang="zh-TW" altLang="en-US" smtClean="0"/>
-              <a:t>2018/11/28</a:t>
+              <a:t>2019/12/5</a:t>
             </a:fld>
             <a:endParaRPr lang="zh-TW" altLang="en-US"/>
           </a:p>
@@ -890,10 +887,9 @@
           <a:lstStyle/>
           <a:p>
             <a:r>
-              <a:rPr lang="zh-TW" altLang="en-US" smtClean="0"/>
+              <a:rPr lang="zh-TW" altLang="en-US"/>
               <a:t>按一下以編輯母片標題樣式</a:t>
             </a:r>
-            <a:endParaRPr lang="zh-TW" altLang="en-US"/>
           </a:p>
         </p:txBody>
       </p:sp>
@@ -919,38 +915,37 @@
           <a:p>
             <a:pPr lvl="0"/>
             <a:r>
-              <a:rPr lang="zh-TW" altLang="en-US" smtClean="0"/>
+              <a:rPr lang="zh-TW" altLang="en-US"/>
               <a:t>按一下以編輯母片文字樣式</a:t>
             </a:r>
           </a:p>
           <a:p>
             <a:pPr lvl="1"/>
             <a:r>
-              <a:rPr lang="zh-TW" altLang="en-US" smtClean="0"/>
+              <a:rPr lang="zh-TW" altLang="en-US"/>
               <a:t>第二層</a:t>
             </a:r>
           </a:p>
           <a:p>
             <a:pPr lvl="2"/>
             <a:r>
-              <a:rPr lang="zh-TW" altLang="en-US" smtClean="0"/>
+              <a:rPr lang="zh-TW" altLang="en-US"/>
               <a:t>第三層</a:t>
             </a:r>
           </a:p>
           <a:p>
             <a:pPr lvl="3"/>
             <a:r>
-              <a:rPr lang="zh-TW" altLang="en-US" smtClean="0"/>
+              <a:rPr lang="zh-TW" altLang="en-US"/>
               <a:t>第四層</a:t>
             </a:r>
           </a:p>
           <a:p>
             <a:pPr lvl="4"/>
             <a:r>
-              <a:rPr lang="zh-TW" altLang="en-US" smtClean="0"/>
+              <a:rPr lang="zh-TW" altLang="en-US"/>
               <a:t>第五層</a:t>
             </a:r>
-            <a:endParaRPr lang="zh-TW" altLang="en-US"/>
           </a:p>
         </p:txBody>
       </p:sp>
@@ -975,7 +970,7 @@
           <a:p>
             <a:fld id="{28320CCE-C547-4A70-B16F-104818F71F93}" type="datetimeFigureOut">
               <a:rPr lang="zh-TW" altLang="en-US" smtClean="0"/>
-              <a:t>2018/11/28</a:t>
+              <a:t>2019/12/5</a:t>
             </a:fld>
             <a:endParaRPr lang="zh-TW" altLang="en-US"/>
           </a:p>
@@ -1084,10 +1079,9 @@
           </a:lstStyle>
           <a:p>
             <a:r>
-              <a:rPr lang="zh-TW" altLang="en-US" smtClean="0"/>
+              <a:rPr lang="zh-TW" altLang="en-US"/>
               <a:t>按一下以編輯母片標題樣式</a:t>
             </a:r>
-            <a:endParaRPr lang="zh-TW" altLang="en-US"/>
           </a:p>
         </p:txBody>
       </p:sp>
@@ -1139,38 +1133,37 @@
           <a:p>
             <a:pPr lvl="0"/>
             <a:r>
-              <a:rPr lang="zh-TW" altLang="en-US" smtClean="0"/>
+              <a:rPr lang="zh-TW" altLang="en-US"/>
               <a:t>按一下以編輯母片文字樣式</a:t>
             </a:r>
           </a:p>
           <a:p>
             <a:pPr lvl="1"/>
             <a:r>
-              <a:rPr lang="zh-TW" altLang="en-US" smtClean="0"/>
+              <a:rPr lang="zh-TW" altLang="en-US"/>
               <a:t>第二層</a:t>
             </a:r>
           </a:p>
           <a:p>
             <a:pPr lvl="2"/>
             <a:r>
-              <a:rPr lang="zh-TW" altLang="en-US" smtClean="0"/>
+              <a:rPr lang="zh-TW" altLang="en-US"/>
               <a:t>第三層</a:t>
             </a:r>
           </a:p>
           <a:p>
             <a:pPr lvl="3"/>
             <a:r>
-              <a:rPr lang="zh-TW" altLang="en-US" smtClean="0"/>
+              <a:rPr lang="zh-TW" altLang="en-US"/>
               <a:t>第四層</a:t>
             </a:r>
           </a:p>
           <a:p>
             <a:pPr lvl="4"/>
             <a:r>
-              <a:rPr lang="zh-TW" altLang="en-US" smtClean="0"/>
+              <a:rPr lang="zh-TW" altLang="en-US"/>
               <a:t>第五層</a:t>
             </a:r>
-            <a:endParaRPr lang="zh-TW" altLang="en-US"/>
           </a:p>
         </p:txBody>
       </p:sp>
@@ -1198,7 +1191,7 @@
           <a:p>
             <a:fld id="{28320CCE-C547-4A70-B16F-104818F71F93}" type="datetimeFigureOut">
               <a:rPr lang="zh-TW" altLang="en-US" smtClean="0"/>
-              <a:t>2018/11/28</a:t>
+              <a:t>2019/12/5</a:t>
             </a:fld>
             <a:endParaRPr lang="zh-TW" altLang="en-US"/>
           </a:p>
@@ -1315,10 +1308,9 @@
           </a:lstStyle>
           <a:p>
             <a:r>
-              <a:rPr lang="zh-TW" altLang="en-US" smtClean="0"/>
+              <a:rPr lang="zh-TW" altLang="en-US"/>
               <a:t>按一下以編輯母片標題樣式</a:t>
             </a:r>
-            <a:endParaRPr lang="zh-TW" altLang="en-US"/>
           </a:p>
         </p:txBody>
       </p:sp>
@@ -1381,7 +1373,7 @@
           <a:p>
             <a:pPr lvl="0"/>
             <a:r>
-              <a:rPr lang="zh-TW" altLang="en-US" smtClean="0"/>
+              <a:rPr lang="zh-TW" altLang="en-US"/>
               <a:t>按一下以編輯母片文字樣式</a:t>
             </a:r>
           </a:p>
@@ -1408,7 +1400,7 @@
           <a:p>
             <a:fld id="{28320CCE-C547-4A70-B16F-104818F71F93}" type="datetimeFigureOut">
               <a:rPr lang="zh-TW" altLang="en-US" smtClean="0"/>
-              <a:t>2018/11/28</a:t>
+              <a:t>2019/12/5</a:t>
             </a:fld>
             <a:endParaRPr lang="zh-TW" altLang="en-US"/>
           </a:p>
@@ -1510,10 +1502,9 @@
           <a:lstStyle/>
           <a:p>
             <a:r>
-              <a:rPr lang="zh-TW" altLang="en-US" smtClean="0"/>
+              <a:rPr lang="zh-TW" altLang="en-US"/>
               <a:t>按一下以編輯母片標題樣式</a:t>
             </a:r>
-            <a:endParaRPr lang="zh-TW" altLang="en-US"/>
           </a:p>
         </p:txBody>
       </p:sp>
@@ -1567,38 +1558,37 @@
           <a:p>
             <a:pPr lvl="0"/>
             <a:r>
-              <a:rPr lang="zh-TW" altLang="en-US" smtClean="0"/>
+              <a:rPr lang="zh-TW" altLang="en-US"/>
               <a:t>按一下以編輯母片文字樣式</a:t>
             </a:r>
           </a:p>
           <a:p>
             <a:pPr lvl="1"/>
             <a:r>
-              <a:rPr lang="zh-TW" altLang="en-US" smtClean="0"/>
+              <a:rPr lang="zh-TW" altLang="en-US"/>
               <a:t>第二層</a:t>
             </a:r>
           </a:p>
           <a:p>
             <a:pPr lvl="2"/>
             <a:r>
-              <a:rPr lang="zh-TW" altLang="en-US" smtClean="0"/>
+              <a:rPr lang="zh-TW" altLang="en-US"/>
               <a:t>第三層</a:t>
             </a:r>
           </a:p>
           <a:p>
             <a:pPr lvl="3"/>
             <a:r>
-              <a:rPr lang="zh-TW" altLang="en-US" smtClean="0"/>
+              <a:rPr lang="zh-TW" altLang="en-US"/>
               <a:t>第四層</a:t>
             </a:r>
           </a:p>
           <a:p>
             <a:pPr lvl="4"/>
             <a:r>
-              <a:rPr lang="zh-TW" altLang="en-US" smtClean="0"/>
+              <a:rPr lang="zh-TW" altLang="en-US"/>
               <a:t>第五層</a:t>
             </a:r>
-            <a:endParaRPr lang="zh-TW" altLang="en-US"/>
           </a:p>
         </p:txBody>
       </p:sp>
@@ -1652,38 +1642,37 @@
           <a:p>
             <a:pPr lvl="0"/>
             <a:r>
-              <a:rPr lang="zh-TW" altLang="en-US" smtClean="0"/>
+              <a:rPr lang="zh-TW" altLang="en-US"/>
               <a:t>按一下以編輯母片文字樣式</a:t>
             </a:r>
           </a:p>
           <a:p>
             <a:pPr lvl="1"/>
             <a:r>
-              <a:rPr lang="zh-TW" altLang="en-US" smtClean="0"/>
+              <a:rPr lang="zh-TW" altLang="en-US"/>
               <a:t>第二層</a:t>
             </a:r>
           </a:p>
           <a:p>
             <a:pPr lvl="2"/>
             <a:r>
-              <a:rPr lang="zh-TW" altLang="en-US" smtClean="0"/>
+              <a:rPr lang="zh-TW" altLang="en-US"/>
               <a:t>第三層</a:t>
             </a:r>
           </a:p>
           <a:p>
             <a:pPr lvl="3"/>
             <a:r>
-              <a:rPr lang="zh-TW" altLang="en-US" smtClean="0"/>
+              <a:rPr lang="zh-TW" altLang="en-US"/>
               <a:t>第四層</a:t>
             </a:r>
           </a:p>
           <a:p>
             <a:pPr lvl="4"/>
             <a:r>
-              <a:rPr lang="zh-TW" altLang="en-US" smtClean="0"/>
+              <a:rPr lang="zh-TW" altLang="en-US"/>
               <a:t>第五層</a:t>
             </a:r>
-            <a:endParaRPr lang="zh-TW" altLang="en-US"/>
           </a:p>
         </p:txBody>
       </p:sp>
@@ -1708,7 +1697,7 @@
           <a:p>
             <a:fld id="{28320CCE-C547-4A70-B16F-104818F71F93}" type="datetimeFigureOut">
               <a:rPr lang="zh-TW" altLang="en-US" smtClean="0"/>
-              <a:t>2018/11/28</a:t>
+              <a:t>2019/12/5</a:t>
             </a:fld>
             <a:endParaRPr lang="zh-TW" altLang="en-US"/>
           </a:p>
@@ -1819,10 +1808,9 @@
           </a:lstStyle>
           <a:p>
             <a:r>
-              <a:rPr lang="zh-TW" altLang="en-US" smtClean="0"/>
+              <a:rPr lang="zh-TW" altLang="en-US"/>
               <a:t>按一下以編輯母片標題樣式</a:t>
             </a:r>
-            <a:endParaRPr lang="zh-TW" altLang="en-US"/>
           </a:p>
         </p:txBody>
       </p:sp>
@@ -1885,7 +1873,7 @@
           <a:p>
             <a:pPr lvl="0"/>
             <a:r>
-              <a:rPr lang="zh-TW" altLang="en-US" smtClean="0"/>
+              <a:rPr lang="zh-TW" altLang="en-US"/>
               <a:t>按一下以編輯母片文字樣式</a:t>
             </a:r>
           </a:p>
@@ -1941,38 +1929,37 @@
           <a:p>
             <a:pPr lvl="0"/>
             <a:r>
-              <a:rPr lang="zh-TW" altLang="en-US" smtClean="0"/>
+              <a:rPr lang="zh-TW" altLang="en-US"/>
               <a:t>按一下以編輯母片文字樣式</a:t>
             </a:r>
           </a:p>
           <a:p>
             <a:pPr lvl="1"/>
             <a:r>
-              <a:rPr lang="zh-TW" altLang="en-US" smtClean="0"/>
+              <a:rPr lang="zh-TW" altLang="en-US"/>
               <a:t>第二層</a:t>
             </a:r>
           </a:p>
           <a:p>
             <a:pPr lvl="2"/>
             <a:r>
-              <a:rPr lang="zh-TW" altLang="en-US" smtClean="0"/>
+              <a:rPr lang="zh-TW" altLang="en-US"/>
               <a:t>第三層</a:t>
             </a:r>
           </a:p>
           <a:p>
             <a:pPr lvl="3"/>
             <a:r>
-              <a:rPr lang="zh-TW" altLang="en-US" smtClean="0"/>
+              <a:rPr lang="zh-TW" altLang="en-US"/>
               <a:t>第四層</a:t>
             </a:r>
           </a:p>
           <a:p>
             <a:pPr lvl="4"/>
             <a:r>
-              <a:rPr lang="zh-TW" altLang="en-US" smtClean="0"/>
+              <a:rPr lang="zh-TW" altLang="en-US"/>
               <a:t>第五層</a:t>
             </a:r>
-            <a:endParaRPr lang="zh-TW" altLang="en-US"/>
           </a:p>
         </p:txBody>
       </p:sp>
@@ -2035,7 +2022,7 @@
           <a:p>
             <a:pPr lvl="0"/>
             <a:r>
-              <a:rPr lang="zh-TW" altLang="en-US" smtClean="0"/>
+              <a:rPr lang="zh-TW" altLang="en-US"/>
               <a:t>按一下以編輯母片文字樣式</a:t>
             </a:r>
           </a:p>
@@ -2091,38 +2078,37 @@
           <a:p>
             <a:pPr lvl="0"/>
             <a:r>
-              <a:rPr lang="zh-TW" altLang="en-US" smtClean="0"/>
+              <a:rPr lang="zh-TW" altLang="en-US"/>
               <a:t>按一下以編輯母片文字樣式</a:t>
             </a:r>
           </a:p>
           <a:p>
             <a:pPr lvl="1"/>
             <a:r>
-              <a:rPr lang="zh-TW" altLang="en-US" smtClean="0"/>
+              <a:rPr lang="zh-TW" altLang="en-US"/>
               <a:t>第二層</a:t>
             </a:r>
           </a:p>
           <a:p>
             <a:pPr lvl="2"/>
             <a:r>
-              <a:rPr lang="zh-TW" altLang="en-US" smtClean="0"/>
+              <a:rPr lang="zh-TW" altLang="en-US"/>
               <a:t>第三層</a:t>
             </a:r>
           </a:p>
           <a:p>
             <a:pPr lvl="3"/>
             <a:r>
-              <a:rPr lang="zh-TW" altLang="en-US" smtClean="0"/>
+              <a:rPr lang="zh-TW" altLang="en-US"/>
               <a:t>第四層</a:t>
             </a:r>
           </a:p>
           <a:p>
             <a:pPr lvl="4"/>
             <a:r>
-              <a:rPr lang="zh-TW" altLang="en-US" smtClean="0"/>
+              <a:rPr lang="zh-TW" altLang="en-US"/>
               <a:t>第五層</a:t>
             </a:r>
-            <a:endParaRPr lang="zh-TW" altLang="en-US"/>
           </a:p>
         </p:txBody>
       </p:sp>
@@ -2147,7 +2133,7 @@
           <a:p>
             <a:fld id="{28320CCE-C547-4A70-B16F-104818F71F93}" type="datetimeFigureOut">
               <a:rPr lang="zh-TW" altLang="en-US" smtClean="0"/>
-              <a:t>2018/11/28</a:t>
+              <a:t>2019/12/5</a:t>
             </a:fld>
             <a:endParaRPr lang="zh-TW" altLang="en-US"/>
           </a:p>
@@ -2256,10 +2242,9 @@
           </a:lstStyle>
           <a:p>
             <a:r>
-              <a:rPr lang="zh-TW" altLang="en-US" smtClean="0"/>
+              <a:rPr lang="zh-TW" altLang="en-US"/>
               <a:t>按一下以編輯母片標題樣式</a:t>
             </a:r>
-            <a:endParaRPr lang="zh-TW" altLang="en-US"/>
           </a:p>
         </p:txBody>
       </p:sp>
@@ -2287,7 +2272,7 @@
           <a:p>
             <a:fld id="{28320CCE-C547-4A70-B16F-104818F71F93}" type="datetimeFigureOut">
               <a:rPr lang="zh-TW" altLang="en-US" smtClean="0"/>
-              <a:t>2018/11/28</a:t>
+              <a:t>2019/12/5</a:t>
             </a:fld>
             <a:endParaRPr lang="zh-TW" altLang="en-US"/>
           </a:p>
@@ -2400,7 +2385,7 @@
           <a:p>
             <a:fld id="{28320CCE-C547-4A70-B16F-104818F71F93}" type="datetimeFigureOut">
               <a:rPr lang="zh-TW" altLang="en-US" smtClean="0"/>
-              <a:t>2018/11/28</a:t>
+              <a:t>2019/12/5</a:t>
             </a:fld>
             <a:endParaRPr lang="zh-TW" altLang="en-US"/>
           </a:p>
@@ -2511,10 +2496,9 @@
           </a:lstStyle>
           <a:p>
             <a:r>
-              <a:rPr lang="zh-TW" altLang="en-US" smtClean="0"/>
+              <a:rPr lang="zh-TW" altLang="en-US"/>
               <a:t>按一下以編輯母片標題樣式</a:t>
             </a:r>
-            <a:endParaRPr lang="zh-TW" altLang="en-US"/>
           </a:p>
         </p:txBody>
       </p:sp>
@@ -2568,38 +2552,37 @@
           <a:p>
             <a:pPr lvl="0"/>
             <a:r>
-              <a:rPr lang="zh-TW" altLang="en-US" smtClean="0"/>
+              <a:rPr lang="zh-TW" altLang="en-US"/>
               <a:t>按一下以編輯母片文字樣式</a:t>
             </a:r>
           </a:p>
           <a:p>
             <a:pPr lvl="1"/>
             <a:r>
-              <a:rPr lang="zh-TW" altLang="en-US" smtClean="0"/>
+              <a:rPr lang="zh-TW" altLang="en-US"/>
               <a:t>第二層</a:t>
             </a:r>
           </a:p>
           <a:p>
             <a:pPr lvl="2"/>
             <a:r>
-              <a:rPr lang="zh-TW" altLang="en-US" smtClean="0"/>
+              <a:rPr lang="zh-TW" altLang="en-US"/>
               <a:t>第三層</a:t>
             </a:r>
           </a:p>
           <a:p>
             <a:pPr lvl="3"/>
             <a:r>
-              <a:rPr lang="zh-TW" altLang="en-US" smtClean="0"/>
+              <a:rPr lang="zh-TW" altLang="en-US"/>
               <a:t>第四層</a:t>
             </a:r>
           </a:p>
           <a:p>
             <a:pPr lvl="4"/>
             <a:r>
-              <a:rPr lang="zh-TW" altLang="en-US" smtClean="0"/>
+              <a:rPr lang="zh-TW" altLang="en-US"/>
               <a:t>第五層</a:t>
             </a:r>
-            <a:endParaRPr lang="zh-TW" altLang="en-US"/>
           </a:p>
         </p:txBody>
       </p:sp>
@@ -2662,7 +2645,7 @@
           <a:p>
             <a:pPr lvl="0"/>
             <a:r>
-              <a:rPr lang="zh-TW" altLang="en-US" smtClean="0"/>
+              <a:rPr lang="zh-TW" altLang="en-US"/>
               <a:t>按一下以編輯母片文字樣式</a:t>
             </a:r>
           </a:p>
@@ -2689,7 +2672,7 @@
           <a:p>
             <a:fld id="{28320CCE-C547-4A70-B16F-104818F71F93}" type="datetimeFigureOut">
               <a:rPr lang="zh-TW" altLang="en-US" smtClean="0"/>
-              <a:t>2018/11/28</a:t>
+              <a:t>2019/12/5</a:t>
             </a:fld>
             <a:endParaRPr lang="zh-TW" altLang="en-US"/>
           </a:p>
@@ -2800,10 +2783,9 @@
           </a:lstStyle>
           <a:p>
             <a:r>
-              <a:rPr lang="zh-TW" altLang="en-US" smtClean="0"/>
+              <a:rPr lang="zh-TW" altLang="en-US"/>
               <a:t>按一下以編輯母片標題樣式</a:t>
             </a:r>
-            <a:endParaRPr lang="zh-TW" altLang="en-US"/>
           </a:p>
         </p:txBody>
       </p:sp>
@@ -2865,10 +2847,9 @@
           </a:lstStyle>
           <a:p>
             <a:r>
-              <a:rPr lang="zh-TW" altLang="en-US" smtClean="0"/>
+              <a:rPr lang="zh-TW" altLang="en-US"/>
               <a:t>按一下圖示以新增圖片</a:t>
             </a:r>
-            <a:endParaRPr lang="zh-TW" altLang="en-US"/>
           </a:p>
         </p:txBody>
       </p:sp>
@@ -2931,7 +2912,7 @@
           <a:p>
             <a:pPr lvl="0"/>
             <a:r>
-              <a:rPr lang="zh-TW" altLang="en-US" smtClean="0"/>
+              <a:rPr lang="zh-TW" altLang="en-US"/>
               <a:t>按一下以編輯母片文字樣式</a:t>
             </a:r>
           </a:p>
@@ -2958,7 +2939,7 @@
           <a:p>
             <a:fld id="{28320CCE-C547-4A70-B16F-104818F71F93}" type="datetimeFigureOut">
               <a:rPr lang="zh-TW" altLang="en-US" smtClean="0"/>
-              <a:t>2018/11/28</a:t>
+              <a:t>2019/12/5</a:t>
             </a:fld>
             <a:endParaRPr lang="zh-TW" altLang="en-US"/>
           </a:p>
@@ -3394,7 +3375,7 @@
           <a:p>
             <a:pPr lvl="0"/>
             <a:r>
-              <a:rPr lang="zh-TW" altLang="en-US" smtClean="0"/>
+              <a:rPr lang="zh-TW" altLang="en-US"/>
               <a:t>按一下以編輯母片標題樣式</a:t>
             </a:r>
           </a:p>
@@ -3437,35 +3418,35 @@
           <a:p>
             <a:pPr lvl="0"/>
             <a:r>
-              <a:rPr lang="zh-TW" altLang="en-US" smtClean="0"/>
+              <a:rPr lang="zh-TW" altLang="en-US"/>
               <a:t>按一下以編輯母片</a:t>
             </a:r>
           </a:p>
           <a:p>
             <a:pPr lvl="1"/>
             <a:r>
-              <a:rPr lang="zh-TW" altLang="en-US" smtClean="0"/>
+              <a:rPr lang="zh-TW" altLang="en-US"/>
               <a:t>第二層</a:t>
             </a:r>
           </a:p>
           <a:p>
             <a:pPr lvl="2"/>
             <a:r>
-              <a:rPr lang="zh-TW" altLang="en-US" smtClean="0"/>
+              <a:rPr lang="zh-TW" altLang="en-US"/>
               <a:t>第三層</a:t>
             </a:r>
           </a:p>
           <a:p>
             <a:pPr lvl="3"/>
             <a:r>
-              <a:rPr lang="zh-TW" altLang="en-US" smtClean="0"/>
+              <a:rPr lang="zh-TW" altLang="en-US"/>
               <a:t>第四層</a:t>
             </a:r>
           </a:p>
           <a:p>
             <a:pPr lvl="4"/>
             <a:r>
-              <a:rPr lang="zh-TW" altLang="en-US" smtClean="0"/>
+              <a:rPr lang="zh-TW" altLang="en-US"/>
               <a:t>第五層</a:t>
             </a:r>
           </a:p>
@@ -3515,7 +3496,7 @@
           <a:p>
             <a:fld id="{28320CCE-C547-4A70-B16F-104818F71F93}" type="datetimeFigureOut">
               <a:rPr lang="zh-TW" altLang="en-US" smtClean="0"/>
-              <a:t>2018/11/28</a:t>
+              <a:t>2019/12/5</a:t>
             </a:fld>
             <a:endParaRPr lang="zh-TW" altLang="en-US"/>
           </a:p>
@@ -4085,7 +4066,7 @@
           <a:lstStyle/>
           <a:p>
             <a:r>
-              <a:rPr lang="en-US" altLang="zh-TW" dirty="0" smtClean="0"/>
+              <a:rPr lang="en-US" altLang="zh-TW" dirty="0"/>
               <a:t>LCD Display</a:t>
             </a:r>
             <a:endParaRPr lang="zh-TW" altLang="en-US" dirty="0"/>
@@ -4155,13 +4136,6 @@
   <p:clrMapOvr>
     <a:masterClrMapping/>
   </p:clrMapOvr>
-  <p:timing>
-    <p:tnLst>
-      <p:par>
-        <p:cTn id="1" dur="indefinite" restart="never" nodeType="tmRoot"/>
-      </p:par>
-    </p:tnLst>
-  </p:timing>
 </p:sld>
 </file>
 
@@ -4198,7 +4172,180 @@
           <a:lstStyle/>
           <a:p>
             <a:r>
-              <a:rPr lang="en-US" altLang="zh-TW" dirty="0" smtClean="0"/>
+              <a:rPr lang="en-US" altLang="zh-TW" dirty="0"/>
+              <a:t>Signal interface to the LCD</a:t>
+            </a:r>
+            <a:endParaRPr lang="zh-TW" altLang="en-US" dirty="0"/>
+          </a:p>
+        </p:txBody>
+      </p:sp>
+      <p:sp>
+        <p:nvSpPr>
+          <p:cNvPr id="3" name="內容版面配置區 2"/>
+          <p:cNvSpPr>
+            <a:spLocks noGrp="1"/>
+          </p:cNvSpPr>
+          <p:nvPr>
+            <p:ph idx="1"/>
+          </p:nvPr>
+        </p:nvSpPr>
+        <p:spPr>
+          <a:xfrm>
+            <a:off x="590843" y="2017713"/>
+            <a:ext cx="3709182" cy="4341054"/>
+          </a:xfrm>
+        </p:spPr>
+        <p:txBody>
+          <a:bodyPr/>
+          <a:lstStyle/>
+          <a:p>
+            <a:r>
+              <a:rPr lang="en-US" altLang="zh-TW" sz="2000" dirty="0"/>
+              <a:t>RS: register select</a:t>
+            </a:r>
+          </a:p>
+          <a:p>
+            <a:pPr lvl="1"/>
+            <a:r>
+              <a:rPr lang="en-US" altLang="zh-TW" sz="1800" dirty="0"/>
+              <a:t>0: command</a:t>
+            </a:r>
+          </a:p>
+          <a:p>
+            <a:pPr lvl="1"/>
+            <a:r>
+              <a:rPr lang="en-US" altLang="zh-TW" sz="1800" dirty="0"/>
+              <a:t>1: data</a:t>
+            </a:r>
+          </a:p>
+          <a:p>
+            <a:r>
+              <a:rPr lang="en-US" altLang="zh-TW" sz="2000" dirty="0"/>
+              <a:t>E: latch enable</a:t>
+            </a:r>
+          </a:p>
+          <a:p>
+            <a:pPr lvl="1"/>
+            <a:r>
+              <a:rPr lang="en-US" altLang="zh-TW" sz="1800" dirty="0"/>
+              <a:t>the LCD latches the command/data at negative edge (1</a:t>
+            </a:r>
+            <a:r>
+              <a:rPr lang="en-US" altLang="zh-TW" sz="1800" dirty="0">
+                <a:sym typeface="Wingdings" panose="05000000000000000000" pitchFamily="2" charset="2"/>
+              </a:rPr>
+              <a:t>0)</a:t>
+            </a:r>
+          </a:p>
+          <a:p>
+            <a:r>
+              <a:rPr lang="en-US" altLang="zh-TW" sz="2000" dirty="0">
+                <a:sym typeface="Wingdings" panose="05000000000000000000" pitchFamily="2" charset="2"/>
+              </a:rPr>
+              <a:t>D [7:0]</a:t>
+            </a:r>
+          </a:p>
+          <a:p>
+            <a:pPr lvl="1"/>
+            <a:r>
+              <a:rPr lang="en-US" altLang="zh-TW" sz="1800" dirty="0">
+                <a:sym typeface="Wingdings" panose="05000000000000000000" pitchFamily="2" charset="2"/>
+              </a:rPr>
+              <a:t>the 8-bit data/command</a:t>
+            </a:r>
+          </a:p>
+          <a:p>
+            <a:pPr lvl="1"/>
+            <a:r>
+              <a:rPr lang="en-US" altLang="zh-TW" sz="1800" dirty="0">
+                <a:sym typeface="Wingdings" panose="05000000000000000000" pitchFamily="2" charset="2"/>
+              </a:rPr>
+              <a:t>configured 4-bit mode</a:t>
+            </a:r>
+          </a:p>
+          <a:p>
+            <a:pPr lvl="1"/>
+            <a:r>
+              <a:rPr lang="en-US" altLang="zh-TW" sz="1800" dirty="0">
+                <a:sym typeface="Wingdings" panose="05000000000000000000" pitchFamily="2" charset="2"/>
+              </a:rPr>
+              <a:t>send higher portion first</a:t>
+            </a:r>
+            <a:endParaRPr lang="zh-TW" altLang="en-US" sz="1800" dirty="0"/>
+          </a:p>
+        </p:txBody>
+      </p:sp>
+      <p:pic>
+        <p:nvPicPr>
+          <p:cNvPr id="4" name="圖片 3"/>
+          <p:cNvPicPr>
+            <a:picLocks noChangeAspect="1"/>
+          </p:cNvPicPr>
+          <p:nvPr/>
+        </p:nvPicPr>
+        <p:blipFill>
+          <a:blip r:embed="rId2"/>
+          <a:stretch>
+            <a:fillRect/>
+          </a:stretch>
+        </p:blipFill>
+        <p:spPr>
+          <a:xfrm>
+            <a:off x="3967090" y="2810836"/>
+            <a:ext cx="5176910" cy="3224373"/>
+          </a:xfrm>
+          <a:prstGeom prst="rect">
+            <a:avLst/>
+          </a:prstGeom>
+        </p:spPr>
+      </p:pic>
+    </p:spTree>
+    <p:extLst>
+      <p:ext uri="{BB962C8B-B14F-4D97-AF65-F5344CB8AC3E}">
+        <p14:creationId xmlns:p14="http://schemas.microsoft.com/office/powerpoint/2010/main" val="3504983280"/>
+      </p:ext>
+    </p:extLst>
+  </p:cSld>
+  <p:clrMapOvr>
+    <a:masterClrMapping/>
+  </p:clrMapOvr>
+</p:sld>
+</file>
+
+<file path=ppt/slides/slide11.xml><?xml version="1.0" encoding="utf-8"?>
+<p:sld xmlns:a="http://schemas.openxmlformats.org/drawingml/2006/main" xmlns:r="http://schemas.openxmlformats.org/officeDocument/2006/relationships" xmlns:p="http://schemas.openxmlformats.org/presentationml/2006/main">
+  <p:cSld>
+    <p:spTree>
+      <p:nvGrpSpPr>
+        <p:cNvPr id="1" name=""/>
+        <p:cNvGrpSpPr/>
+        <p:nvPr/>
+      </p:nvGrpSpPr>
+      <p:grpSpPr>
+        <a:xfrm>
+          <a:off x="0" y="0"/>
+          <a:ext cx="0" cy="0"/>
+          <a:chOff x="0" y="0"/>
+          <a:chExt cx="0" cy="0"/>
+        </a:xfrm>
+      </p:grpSpPr>
+      <p:sp>
+        <p:nvSpPr>
+          <p:cNvPr id="2" name="標題 1"/>
+          <p:cNvSpPr>
+            <a:spLocks noGrp="1"/>
+          </p:cNvSpPr>
+          <p:nvPr>
+            <p:ph type="title"/>
+          </p:nvPr>
+        </p:nvSpPr>
+        <p:spPr/>
+        <p:txBody>
+          <a:bodyPr/>
+          <a:lstStyle/>
+          <a:p>
+            <a:r>
+              <a:rPr lang="en-US" altLang="zh-TW" dirty="0"/>
               <a:t>List of commands</a:t>
             </a:r>
             <a:endParaRPr lang="zh-TW" altLang="en-US" dirty="0"/>
@@ -4267,17 +4414,10 @@
   <p:clrMapOvr>
     <a:masterClrMapping/>
   </p:clrMapOvr>
-  <p:timing>
-    <p:tnLst>
-      <p:par>
-        <p:cTn id="1" dur="indefinite" restart="never" nodeType="tmRoot"/>
-      </p:par>
-    </p:tnLst>
-  </p:timing>
 </p:sld>
 </file>
 
-<file path=ppt/slides/slide11.xml><?xml version="1.0" encoding="utf-8"?>
+<file path=ppt/slides/slide12.xml><?xml version="1.0" encoding="utf-8"?>
 <p:sld xmlns:a="http://schemas.openxmlformats.org/drawingml/2006/main" xmlns:r="http://schemas.openxmlformats.org/officeDocument/2006/relationships" xmlns:p="http://schemas.openxmlformats.org/presentationml/2006/main">
   <p:cSld>
     <p:spTree>
@@ -4310,7 +4450,7 @@
           <a:lstStyle/>
           <a:p>
             <a:r>
-              <a:rPr lang="en-US" altLang="zh-TW" dirty="0" smtClean="0"/>
+              <a:rPr lang="en-US" altLang="zh-TW" dirty="0"/>
               <a:t>Timing diagram to send command/data</a:t>
             </a:r>
             <a:endParaRPr lang="zh-TW" altLang="en-US" dirty="0"/>
@@ -4338,13 +4478,13 @@
           <a:lstStyle/>
           <a:p>
             <a:r>
-              <a:rPr lang="en-US" altLang="zh-TW" sz="2400" dirty="0" smtClean="0"/>
+              <a:rPr lang="en-US" altLang="zh-TW" sz="2400" dirty="0"/>
               <a:t>Example: to send command 0x01 </a:t>
             </a:r>
           </a:p>
           <a:p>
             <a:r>
-              <a:rPr lang="en-US" altLang="zh-TW" sz="2400" dirty="0" smtClean="0"/>
+              <a:rPr lang="en-US" altLang="zh-TW" sz="2400" dirty="0"/>
               <a:t>clear screen, cursor home</a:t>
             </a:r>
           </a:p>
@@ -5426,17 +5566,10 @@
   <p:clrMapOvr>
     <a:masterClrMapping/>
   </p:clrMapOvr>
-  <p:timing>
-    <p:tnLst>
-      <p:par>
-        <p:cTn id="1" dur="indefinite" restart="never" nodeType="tmRoot"/>
-      </p:par>
-    </p:tnLst>
-  </p:timing>
 </p:sld>
 </file>
 
-<file path=ppt/slides/slide12.xml><?xml version="1.0" encoding="utf-8"?>
+<file path=ppt/slides/slide13.xml><?xml version="1.0" encoding="utf-8"?>
 <p:sld xmlns:a="http://schemas.openxmlformats.org/drawingml/2006/main" xmlns:r="http://schemas.openxmlformats.org/officeDocument/2006/relationships" xmlns:p="http://schemas.openxmlformats.org/presentationml/2006/main">
   <p:cSld>
     <p:spTree>
@@ -5469,7 +5602,7 @@
           <a:lstStyle/>
           <a:p>
             <a:r>
-              <a:rPr lang="en-US" altLang="zh-TW" dirty="0" smtClean="0"/>
+              <a:rPr lang="en-US" altLang="zh-TW" dirty="0"/>
               <a:t>Timing diagram to send command/data</a:t>
             </a:r>
             <a:endParaRPr lang="zh-TW" altLang="en-US" dirty="0"/>
@@ -5497,13 +5630,13 @@
           <a:lstStyle/>
           <a:p>
             <a:r>
-              <a:rPr lang="en-US" altLang="zh-TW" sz="2400" dirty="0" smtClean="0"/>
+              <a:rPr lang="en-US" altLang="zh-TW" sz="2400" dirty="0"/>
               <a:t>Example: to send data ‘A’=0x41</a:t>
             </a:r>
           </a:p>
           <a:p>
             <a:r>
-              <a:rPr lang="en-US" altLang="zh-TW" sz="2400" dirty="0" smtClean="0"/>
+              <a:rPr lang="en-US" altLang="zh-TW" sz="2400" dirty="0"/>
               <a:t>The LCD prints ‘A’ at the cursor position</a:t>
             </a:r>
             <a:endParaRPr lang="zh-TW" altLang="en-US" sz="2400" dirty="0"/>
@@ -6586,17 +6719,10 @@
   <p:clrMapOvr>
     <a:masterClrMapping/>
   </p:clrMapOvr>
-  <p:timing>
-    <p:tnLst>
-      <p:par>
-        <p:cTn id="1" dur="indefinite" restart="never" nodeType="tmRoot"/>
-      </p:par>
-    </p:tnLst>
-  </p:timing>
 </p:sld>
 </file>
 
-<file path=ppt/slides/slide13.xml><?xml version="1.0" encoding="utf-8"?>
+<file path=ppt/slides/slide14.xml><?xml version="1.0" encoding="utf-8"?>
 <p:sld xmlns:a="http://schemas.openxmlformats.org/drawingml/2006/main" xmlns:r="http://schemas.openxmlformats.org/officeDocument/2006/relationships" xmlns:p="http://schemas.openxmlformats.org/presentationml/2006/main">
   <p:cSld>
     <p:spTree>
@@ -6629,7 +6755,7 @@
           <a:lstStyle/>
           <a:p>
             <a:r>
-              <a:rPr lang="en-US" altLang="zh-TW" dirty="0" smtClean="0"/>
+              <a:rPr lang="en-US" altLang="zh-TW" dirty="0"/>
               <a:t>How to program the LCD</a:t>
             </a:r>
             <a:endParaRPr lang="zh-TW" altLang="en-US" dirty="0"/>
@@ -6652,11 +6778,11 @@
           <a:lstStyle/>
           <a:p>
             <a:r>
-              <a:rPr lang="en-US" altLang="zh-TW" dirty="0" smtClean="0"/>
+              <a:rPr lang="en-US" altLang="zh-TW" dirty="0"/>
               <a:t>Demo: </a:t>
             </a:r>
             <a:r>
-              <a:rPr lang="en-US" altLang="zh-TW" dirty="0" err="1" smtClean="0"/>
+              <a:rPr lang="en-US" altLang="zh-TW" dirty="0" err="1"/>
               <a:t>LCD_Hello</a:t>
             </a:r>
             <a:endParaRPr lang="zh-TW" altLang="en-US" dirty="0"/>
@@ -6673,17 +6799,10 @@
   <p:clrMapOvr>
     <a:masterClrMapping/>
   </p:clrMapOvr>
-  <p:timing>
-    <p:tnLst>
-      <p:par>
-        <p:cTn id="1" dur="indefinite" restart="never" nodeType="tmRoot"/>
-      </p:par>
-    </p:tnLst>
-  </p:timing>
 </p:sld>
 </file>
 
-<file path=ppt/slides/slide14.xml><?xml version="1.0" encoding="utf-8"?>
+<file path=ppt/slides/slide15.xml><?xml version="1.0" encoding="utf-8"?>
 <p:sld xmlns:a="http://schemas.openxmlformats.org/drawingml/2006/main" xmlns:r="http://schemas.openxmlformats.org/officeDocument/2006/relationships" xmlns:p="http://schemas.openxmlformats.org/presentationml/2006/main">
   <p:cSld>
     <p:spTree>
@@ -6716,7 +6835,7 @@
           <a:lstStyle/>
           <a:p>
             <a:r>
-              <a:rPr lang="en-US" altLang="zh-TW" dirty="0" smtClean="0"/>
+              <a:rPr lang="en-US" altLang="zh-TW" dirty="0"/>
               <a:t>Initialize the LCD</a:t>
             </a:r>
             <a:endParaRPr lang="zh-TW" altLang="en-US" dirty="0"/>
@@ -6757,17 +6876,10 @@
   <p:clrMapOvr>
     <a:masterClrMapping/>
   </p:clrMapOvr>
-  <p:timing>
-    <p:tnLst>
-      <p:par>
-        <p:cTn id="1" dur="indefinite" restart="never" nodeType="tmRoot"/>
-      </p:par>
-    </p:tnLst>
-  </p:timing>
 </p:sld>
 </file>
 
-<file path=ppt/slides/slide15.xml><?xml version="1.0" encoding="utf-8"?>
+<file path=ppt/slides/slide16.xml><?xml version="1.0" encoding="utf-8"?>
 <p:sld xmlns:a="http://schemas.openxmlformats.org/drawingml/2006/main" xmlns:r="http://schemas.openxmlformats.org/officeDocument/2006/relationships" xmlns:p="http://schemas.openxmlformats.org/presentationml/2006/main">
   <p:cSld>
     <p:spTree>
@@ -6800,7 +6912,7 @@
           <a:lstStyle/>
           <a:p>
             <a:r>
-              <a:rPr lang="en-US" altLang="zh-TW" dirty="0" smtClean="0"/>
+              <a:rPr lang="en-US" altLang="zh-TW" dirty="0"/>
               <a:t>Program to send command/data</a:t>
             </a:r>
             <a:endParaRPr lang="zh-TW" altLang="en-US" dirty="0"/>
@@ -6828,13 +6940,13 @@
           <a:lstStyle/>
           <a:p>
             <a:r>
-              <a:rPr lang="en-US" altLang="zh-TW" sz="2400" dirty="0" smtClean="0"/>
+              <a:rPr lang="en-US" altLang="zh-TW" sz="2400" dirty="0"/>
               <a:t>Example: to send data ‘A’=0x41</a:t>
             </a:r>
           </a:p>
           <a:p>
             <a:r>
-              <a:rPr lang="en-US" altLang="zh-TW" sz="2400" dirty="0" smtClean="0"/>
+              <a:rPr lang="en-US" altLang="zh-TW" sz="2400" dirty="0"/>
               <a:t>The LCD prints ‘A’ at the cursor position</a:t>
             </a:r>
             <a:endParaRPr lang="zh-TW" altLang="en-US" sz="2400" dirty="0"/>
@@ -7504,7 +7616,7 @@
             <a:lstStyle/>
             <a:p>
               <a:r>
-                <a:rPr lang="en-US" altLang="zh-TW" sz="2000" dirty="0" smtClean="0">
+                <a:rPr lang="en-US" altLang="zh-TW" sz="2000" dirty="0">
                   <a:solidFill>
                     <a:srgbClr val="FF0000"/>
                   </a:solidFill>
@@ -7941,17 +8053,10 @@
   <p:clrMapOvr>
     <a:masterClrMapping/>
   </p:clrMapOvr>
-  <p:timing>
-    <p:tnLst>
-      <p:par>
-        <p:cTn id="1" dur="indefinite" restart="never" nodeType="tmRoot"/>
-      </p:par>
-    </p:tnLst>
-  </p:timing>
 </p:sld>
 </file>
 
-<file path=ppt/slides/slide16.xml><?xml version="1.0" encoding="utf-8"?>
+<file path=ppt/slides/slide17.xml><?xml version="1.0" encoding="utf-8"?>
 <p:sld xmlns:a="http://schemas.openxmlformats.org/drawingml/2006/main" xmlns:r="http://schemas.openxmlformats.org/officeDocument/2006/relationships" xmlns:p="http://schemas.openxmlformats.org/presentationml/2006/main">
   <p:cSld>
     <p:spTree>
@@ -7984,7 +8089,7 @@
           <a:lstStyle/>
           <a:p>
             <a:r>
-              <a:rPr lang="en-US" altLang="zh-TW" dirty="0" smtClean="0"/>
+              <a:rPr lang="en-US" altLang="zh-TW" dirty="0"/>
               <a:t>Program to send command/data</a:t>
             </a:r>
             <a:endParaRPr lang="zh-TW" altLang="en-US" dirty="0"/>
@@ -8012,13 +8117,13 @@
           <a:lstStyle/>
           <a:p>
             <a:r>
-              <a:rPr lang="en-US" altLang="zh-TW" sz="2400" dirty="0" smtClean="0"/>
+              <a:rPr lang="en-US" altLang="zh-TW" sz="2400" dirty="0"/>
               <a:t>Example: to send data ‘A’=0x41</a:t>
             </a:r>
           </a:p>
           <a:p>
             <a:r>
-              <a:rPr lang="en-US" altLang="zh-TW" sz="2400" dirty="0" smtClean="0"/>
+              <a:rPr lang="en-US" altLang="zh-TW" sz="2400" dirty="0"/>
               <a:t>The LCD prints ‘A’ at the cursor position</a:t>
             </a:r>
             <a:endParaRPr lang="zh-TW" altLang="en-US" sz="2400" dirty="0"/>
@@ -8688,7 +8793,7 @@
             <a:lstStyle/>
             <a:p>
               <a:r>
-                <a:rPr lang="en-US" altLang="zh-TW" sz="2000" dirty="0" smtClean="0">
+                <a:rPr lang="en-US" altLang="zh-TW" sz="2000" dirty="0">
                   <a:solidFill>
                     <a:srgbClr val="FF0000"/>
                   </a:solidFill>
@@ -9098,22 +9203,13 @@
           <a:lstStyle/>
           <a:p>
             <a:r>
-              <a:rPr lang="en-US" altLang="zh-TW" sz="1600" dirty="0" smtClean="0">
-                <a:solidFill>
-                  <a:srgbClr val="FF0000"/>
-                </a:solidFill>
-                <a:latin typeface="Times New Roman" panose="02020603050405020304" pitchFamily="18" charset="0"/>
-              </a:rPr>
-              <a:t>Send out </a:t>
-            </a:r>
-            <a:r>
               <a:rPr lang="en-US" altLang="zh-TW" sz="1600" dirty="0">
                 <a:solidFill>
                   <a:srgbClr val="FF0000"/>
                 </a:solidFill>
                 <a:latin typeface="Times New Roman" panose="02020603050405020304" pitchFamily="18" charset="0"/>
               </a:rPr>
-              <a:t>the status word</a:t>
+              <a:t>Send out the status word</a:t>
             </a:r>
             <a:endParaRPr lang="zh-TW" altLang="en-US" sz="1600" dirty="0">
               <a:solidFill>
@@ -9134,17 +9230,10 @@
   <p:clrMapOvr>
     <a:masterClrMapping/>
   </p:clrMapOvr>
-  <p:timing>
-    <p:tnLst>
-      <p:par>
-        <p:cTn id="1" dur="indefinite" restart="never" nodeType="tmRoot"/>
-      </p:par>
-    </p:tnLst>
-  </p:timing>
 </p:sld>
 </file>
 
-<file path=ppt/slides/slide17.xml><?xml version="1.0" encoding="utf-8"?>
+<file path=ppt/slides/slide18.xml><?xml version="1.0" encoding="utf-8"?>
 <p:sld xmlns:a="http://schemas.openxmlformats.org/drawingml/2006/main" xmlns:r="http://schemas.openxmlformats.org/officeDocument/2006/relationships" xmlns:p="http://schemas.openxmlformats.org/presentationml/2006/main">
   <p:cSld>
     <p:spTree>
@@ -9177,7 +9266,7 @@
           <a:lstStyle/>
           <a:p>
             <a:r>
-              <a:rPr lang="en-US" altLang="zh-TW" dirty="0" smtClean="0"/>
+              <a:rPr lang="en-US" altLang="zh-TW" dirty="0"/>
               <a:t>Program to send command/data</a:t>
             </a:r>
             <a:endParaRPr lang="zh-TW" altLang="en-US" dirty="0"/>
@@ -9205,13 +9294,13 @@
           <a:lstStyle/>
           <a:p>
             <a:r>
-              <a:rPr lang="en-US" altLang="zh-TW" sz="2400" dirty="0" smtClean="0"/>
+              <a:rPr lang="en-US" altLang="zh-TW" sz="2400" dirty="0"/>
               <a:t>Example: to send data ‘A’=0x41</a:t>
             </a:r>
           </a:p>
           <a:p>
             <a:r>
-              <a:rPr lang="en-US" altLang="zh-TW" sz="2400" dirty="0" smtClean="0"/>
+              <a:rPr lang="en-US" altLang="zh-TW" sz="2400" dirty="0"/>
               <a:t>The LCD prints ‘A’ at the cursor position</a:t>
             </a:r>
             <a:endParaRPr lang="zh-TW" altLang="en-US" sz="2400" dirty="0"/>
@@ -9881,7 +9970,7 @@
             <a:lstStyle/>
             <a:p>
               <a:r>
-                <a:rPr lang="en-US" altLang="zh-TW" sz="2000" dirty="0" smtClean="0">
+                <a:rPr lang="en-US" altLang="zh-TW" sz="2000" dirty="0">
                   <a:solidFill>
                     <a:srgbClr val="FF0000"/>
                   </a:solidFill>
@@ -10318,17 +10407,10 @@
   <p:clrMapOvr>
     <a:masterClrMapping/>
   </p:clrMapOvr>
-  <p:timing>
-    <p:tnLst>
-      <p:par>
-        <p:cTn id="1" dur="indefinite" restart="never" nodeType="tmRoot"/>
-      </p:par>
-    </p:tnLst>
-  </p:timing>
 </p:sld>
 </file>
 
-<file path=ppt/slides/slide18.xml><?xml version="1.0" encoding="utf-8"?>
+<file path=ppt/slides/slide19.xml><?xml version="1.0" encoding="utf-8"?>
 <p:sld xmlns:a="http://schemas.openxmlformats.org/drawingml/2006/main" xmlns:r="http://schemas.openxmlformats.org/officeDocument/2006/relationships" xmlns:p="http://schemas.openxmlformats.org/presentationml/2006/main">
   <p:cSld>
     <p:spTree>
@@ -10361,7 +10443,7 @@
           <a:lstStyle/>
           <a:p>
             <a:r>
-              <a:rPr lang="en-US" altLang="zh-TW" dirty="0" smtClean="0"/>
+              <a:rPr lang="en-US" altLang="zh-TW" dirty="0"/>
               <a:t>Program to send command/data</a:t>
             </a:r>
             <a:endParaRPr lang="zh-TW" altLang="en-US" dirty="0"/>
@@ -10389,13 +10471,13 @@
           <a:lstStyle/>
           <a:p>
             <a:r>
-              <a:rPr lang="en-US" altLang="zh-TW" sz="2400" dirty="0" smtClean="0"/>
+              <a:rPr lang="en-US" altLang="zh-TW" sz="2400" dirty="0"/>
               <a:t>Example: to send data ‘A’=0x41</a:t>
             </a:r>
           </a:p>
           <a:p>
             <a:r>
-              <a:rPr lang="en-US" altLang="zh-TW" sz="2400" dirty="0" smtClean="0"/>
+              <a:rPr lang="en-US" altLang="zh-TW" sz="2400" dirty="0"/>
               <a:t>The LCD prints ‘A’ at the cursor position</a:t>
             </a:r>
             <a:endParaRPr lang="zh-TW" altLang="en-US" sz="2400" dirty="0"/>
@@ -11065,7 +11147,7 @@
             <a:lstStyle/>
             <a:p>
               <a:r>
-                <a:rPr lang="en-US" altLang="zh-TW" sz="2000" dirty="0" smtClean="0">
+                <a:rPr lang="en-US" altLang="zh-TW" sz="2000" dirty="0">
                   <a:solidFill>
                     <a:srgbClr val="FF0000"/>
                   </a:solidFill>
@@ -11475,22 +11557,13 @@
           <a:lstStyle/>
           <a:p>
             <a:r>
-              <a:rPr lang="en-US" altLang="zh-TW" sz="1600" dirty="0" smtClean="0">
-                <a:solidFill>
-                  <a:srgbClr val="FF0000"/>
-                </a:solidFill>
-                <a:latin typeface="Times New Roman" panose="02020603050405020304" pitchFamily="18" charset="0"/>
-              </a:rPr>
-              <a:t>Send out the </a:t>
-            </a:r>
-            <a:r>
               <a:rPr lang="en-US" altLang="zh-TW" sz="1600" dirty="0">
                 <a:solidFill>
                   <a:srgbClr val="FF0000"/>
                 </a:solidFill>
                 <a:latin typeface="Times New Roman" panose="02020603050405020304" pitchFamily="18" charset="0"/>
               </a:rPr>
-              <a:t>status word</a:t>
+              <a:t>Send out the status word</a:t>
             </a:r>
             <a:endParaRPr lang="zh-TW" altLang="en-US" sz="1600" dirty="0">
               <a:solidFill>
@@ -11511,17 +11584,10 @@
   <p:clrMapOvr>
     <a:masterClrMapping/>
   </p:clrMapOvr>
-  <p:timing>
-    <p:tnLst>
-      <p:par>
-        <p:cTn id="1" dur="indefinite" restart="never" nodeType="tmRoot"/>
-      </p:par>
-    </p:tnLst>
-  </p:timing>
 </p:sld>
 </file>
 
-<file path=ppt/slides/slide19.xml><?xml version="1.0" encoding="utf-8"?>
+<file path=ppt/slides/slide2.xml><?xml version="1.0" encoding="utf-8"?>
 <p:sld xmlns:a="http://schemas.openxmlformats.org/drawingml/2006/main" xmlns:r="http://schemas.openxmlformats.org/officeDocument/2006/relationships" xmlns:p="http://schemas.openxmlformats.org/presentationml/2006/main">
   <p:cSld>
     <p:spTree>
@@ -11554,7 +11620,631 @@
           <a:lstStyle/>
           <a:p>
             <a:r>
-              <a:rPr lang="en-US" altLang="zh-TW" dirty="0" smtClean="0"/>
+              <a:rPr lang="en-US" altLang="zh-TW" dirty="0"/>
+              <a:t>Your Task</a:t>
+            </a:r>
+            <a:endParaRPr lang="zh-TW" altLang="en-US" dirty="0"/>
+          </a:p>
+        </p:txBody>
+      </p:sp>
+      <p:sp>
+        <p:nvSpPr>
+          <p:cNvPr id="3" name="內容版面配置區 2"/>
+          <p:cNvSpPr>
+            <a:spLocks noGrp="1"/>
+          </p:cNvSpPr>
+          <p:nvPr>
+            <p:ph idx="1"/>
+          </p:nvPr>
+        </p:nvSpPr>
+        <p:spPr>
+          <a:xfrm>
+            <a:off x="1182688" y="2017713"/>
+            <a:ext cx="7772400" cy="1189721"/>
+          </a:xfrm>
+        </p:spPr>
+        <p:txBody>
+          <a:bodyPr/>
+          <a:lstStyle/>
+          <a:p>
+            <a:r>
+              <a:rPr lang="en-US" altLang="zh-TW" dirty="0"/>
+              <a:t>Display characters according to the button pressed</a:t>
+            </a:r>
+            <a:endParaRPr lang="zh-TW" altLang="en-US" dirty="0"/>
+          </a:p>
+        </p:txBody>
+      </p:sp>
+      <p:sp>
+        <p:nvSpPr>
+          <p:cNvPr id="4" name="橢圓 3"/>
+          <p:cNvSpPr/>
+          <p:nvPr/>
+        </p:nvSpPr>
+        <p:spPr bwMode="auto">
+          <a:xfrm>
+            <a:off x="1547446" y="3784209"/>
+            <a:ext cx="562708" cy="407963"/>
+          </a:xfrm>
+          <a:prstGeom prst="ellipse">
+            <a:avLst/>
+          </a:prstGeom>
+          <a:noFill/>
+          <a:ln w="9525" cap="flat" cmpd="sng" algn="ctr">
+            <a:solidFill>
+              <a:schemeClr val="tx1"/>
+            </a:solidFill>
+            <a:prstDash val="solid"/>
+            <a:round/>
+            <a:headEnd type="none" w="med" len="med"/>
+            <a:tailEnd type="none" w="med" len="med"/>
+          </a:ln>
+          <a:effectLst/>
+        </p:spPr>
+        <p:txBody>
+          <a:bodyPr rot="0" spcFirstLastPara="0" vertOverflow="overflow" horzOverflow="overflow" vert="horz" wrap="square" lIns="91440" tIns="45720" rIns="91440" bIns="45720" numCol="1" spcCol="0" rtlCol="0" fromWordArt="0" anchor="ctr" anchorCtr="0" forceAA="0" compatLnSpc="1">
+            <a:prstTxWarp prst="textNoShape">
+              <a:avLst/>
+            </a:prstTxWarp>
+            <a:noAutofit/>
+          </a:bodyPr>
+          <a:lstStyle/>
+          <a:p>
+            <a:pPr marL="0" marR="0" indent="0" algn="ctr" defTabSz="914400" rtl="0" eaLnBrk="0" fontAlgn="base" latinLnBrk="0" hangingPunct="0">
+              <a:lnSpc>
+                <a:spcPct val="100000"/>
+              </a:lnSpc>
+              <a:spcBef>
+                <a:spcPct val="0"/>
+              </a:spcBef>
+              <a:spcAft>
+                <a:spcPct val="0"/>
+              </a:spcAft>
+              <a:buClrTx/>
+              <a:buSzTx/>
+              <a:buFontTx/>
+              <a:buNone/>
+              <a:tabLst/>
+            </a:pPr>
+            <a:r>
+              <a:rPr kumimoji="0" lang="en-US" altLang="zh-TW" sz="1600" b="0" i="0" u="none" strike="noStrike" cap="none" normalizeH="0" baseline="0" dirty="0">
+                <a:ln>
+                  <a:noFill/>
+                </a:ln>
+                <a:solidFill>
+                  <a:schemeClr val="tx1"/>
+                </a:solidFill>
+                <a:effectLst/>
+                <a:latin typeface="Times New Roman" panose="02020603050405020304" pitchFamily="18" charset="0"/>
+                <a:cs typeface="Times New Roman" panose="02020603050405020304" pitchFamily="18" charset="0"/>
+              </a:rPr>
+              <a:t>A</a:t>
+            </a:r>
+            <a:endParaRPr kumimoji="0" lang="zh-TW" altLang="en-US" sz="1600" b="0" i="0" u="none" strike="noStrike" cap="none" normalizeH="0" baseline="0" dirty="0">
+              <a:ln>
+                <a:noFill/>
+              </a:ln>
+              <a:solidFill>
+                <a:schemeClr val="tx1"/>
+              </a:solidFill>
+              <a:effectLst/>
+              <a:latin typeface="Times New Roman" panose="02020603050405020304" pitchFamily="18" charset="0"/>
+              <a:cs typeface="Times New Roman" panose="02020603050405020304" pitchFamily="18" charset="0"/>
+            </a:endParaRPr>
+          </a:p>
+        </p:txBody>
+      </p:sp>
+      <p:sp>
+        <p:nvSpPr>
+          <p:cNvPr id="5" name="橢圓 4"/>
+          <p:cNvSpPr/>
+          <p:nvPr/>
+        </p:nvSpPr>
+        <p:spPr bwMode="auto">
+          <a:xfrm>
+            <a:off x="1547446" y="4360984"/>
+            <a:ext cx="562708" cy="407963"/>
+          </a:xfrm>
+          <a:prstGeom prst="ellipse">
+            <a:avLst/>
+          </a:prstGeom>
+          <a:noFill/>
+          <a:ln w="9525" cap="flat" cmpd="sng" algn="ctr">
+            <a:solidFill>
+              <a:schemeClr val="tx1"/>
+            </a:solidFill>
+            <a:prstDash val="solid"/>
+            <a:round/>
+            <a:headEnd type="none" w="med" len="med"/>
+            <a:tailEnd type="none" w="med" len="med"/>
+          </a:ln>
+          <a:effectLst/>
+        </p:spPr>
+        <p:txBody>
+          <a:bodyPr rot="0" spcFirstLastPara="0" vertOverflow="overflow" horzOverflow="overflow" vert="horz" wrap="square" lIns="91440" tIns="45720" rIns="91440" bIns="45720" numCol="1" spcCol="0" rtlCol="0" fromWordArt="0" anchor="ctr" anchorCtr="0" forceAA="0" compatLnSpc="1">
+            <a:prstTxWarp prst="textNoShape">
+              <a:avLst/>
+            </a:prstTxWarp>
+            <a:noAutofit/>
+          </a:bodyPr>
+          <a:lstStyle/>
+          <a:p>
+            <a:pPr marL="0" marR="0" indent="0" algn="ctr" defTabSz="914400" rtl="0" eaLnBrk="0" fontAlgn="base" latinLnBrk="0" hangingPunct="0">
+              <a:lnSpc>
+                <a:spcPct val="100000"/>
+              </a:lnSpc>
+              <a:spcBef>
+                <a:spcPct val="0"/>
+              </a:spcBef>
+              <a:spcAft>
+                <a:spcPct val="0"/>
+              </a:spcAft>
+              <a:buClrTx/>
+              <a:buSzTx/>
+              <a:buFontTx/>
+              <a:buNone/>
+              <a:tabLst/>
+            </a:pPr>
+            <a:r>
+              <a:rPr kumimoji="0" lang="en-US" altLang="zh-TW" sz="1600" b="0" i="0" u="none" strike="noStrike" cap="none" normalizeH="0" baseline="0" dirty="0">
+                <a:ln>
+                  <a:noFill/>
+                </a:ln>
+                <a:solidFill>
+                  <a:schemeClr val="tx1"/>
+                </a:solidFill>
+                <a:effectLst/>
+                <a:latin typeface="Times New Roman" panose="02020603050405020304" pitchFamily="18" charset="0"/>
+                <a:cs typeface="Times New Roman" panose="02020603050405020304" pitchFamily="18" charset="0"/>
+              </a:rPr>
+              <a:t>B</a:t>
+            </a:r>
+            <a:endParaRPr kumimoji="0" lang="zh-TW" altLang="en-US" sz="1600" b="0" i="0" u="none" strike="noStrike" cap="none" normalizeH="0" baseline="0" dirty="0">
+              <a:ln>
+                <a:noFill/>
+              </a:ln>
+              <a:solidFill>
+                <a:schemeClr val="tx1"/>
+              </a:solidFill>
+              <a:effectLst/>
+              <a:latin typeface="Times New Roman" panose="02020603050405020304" pitchFamily="18" charset="0"/>
+              <a:cs typeface="Times New Roman" panose="02020603050405020304" pitchFamily="18" charset="0"/>
+            </a:endParaRPr>
+          </a:p>
+        </p:txBody>
+      </p:sp>
+      <p:sp>
+        <p:nvSpPr>
+          <p:cNvPr id="6" name="橢圓 5"/>
+          <p:cNvSpPr/>
+          <p:nvPr/>
+        </p:nvSpPr>
+        <p:spPr bwMode="auto">
+          <a:xfrm>
+            <a:off x="1547446" y="4944792"/>
+            <a:ext cx="562708" cy="407963"/>
+          </a:xfrm>
+          <a:prstGeom prst="ellipse">
+            <a:avLst/>
+          </a:prstGeom>
+          <a:noFill/>
+          <a:ln w="9525" cap="flat" cmpd="sng" algn="ctr">
+            <a:solidFill>
+              <a:schemeClr val="tx1"/>
+            </a:solidFill>
+            <a:prstDash val="solid"/>
+            <a:round/>
+            <a:headEnd type="none" w="med" len="med"/>
+            <a:tailEnd type="none" w="med" len="med"/>
+          </a:ln>
+          <a:effectLst/>
+        </p:spPr>
+        <p:txBody>
+          <a:bodyPr rot="0" spcFirstLastPara="0" vertOverflow="overflow" horzOverflow="overflow" vert="horz" wrap="square" lIns="91440" tIns="45720" rIns="91440" bIns="45720" numCol="1" spcCol="0" rtlCol="0" fromWordArt="0" anchor="ctr" anchorCtr="0" forceAA="0" compatLnSpc="1">
+            <a:prstTxWarp prst="textNoShape">
+              <a:avLst/>
+            </a:prstTxWarp>
+            <a:noAutofit/>
+          </a:bodyPr>
+          <a:lstStyle/>
+          <a:p>
+            <a:pPr marL="0" marR="0" indent="0" algn="ctr" defTabSz="914400" rtl="0" eaLnBrk="0" fontAlgn="base" latinLnBrk="0" hangingPunct="0">
+              <a:lnSpc>
+                <a:spcPct val="100000"/>
+              </a:lnSpc>
+              <a:spcBef>
+                <a:spcPct val="0"/>
+              </a:spcBef>
+              <a:spcAft>
+                <a:spcPct val="0"/>
+              </a:spcAft>
+              <a:buClrTx/>
+              <a:buSzTx/>
+              <a:buFontTx/>
+              <a:buNone/>
+              <a:tabLst/>
+            </a:pPr>
+            <a:r>
+              <a:rPr kumimoji="0" lang="en-US" altLang="zh-TW" sz="1600" b="0" i="0" u="none" strike="noStrike" cap="none" normalizeH="0" baseline="0" dirty="0">
+                <a:ln>
+                  <a:noFill/>
+                </a:ln>
+                <a:solidFill>
+                  <a:schemeClr val="tx1"/>
+                </a:solidFill>
+                <a:effectLst/>
+                <a:latin typeface="Times New Roman" panose="02020603050405020304" pitchFamily="18" charset="0"/>
+                <a:cs typeface="Times New Roman" panose="02020603050405020304" pitchFamily="18" charset="0"/>
+              </a:rPr>
+              <a:t>C</a:t>
+            </a:r>
+            <a:endParaRPr kumimoji="0" lang="zh-TW" altLang="en-US" sz="1600" b="0" i="0" u="none" strike="noStrike" cap="none" normalizeH="0" baseline="0" dirty="0">
+              <a:ln>
+                <a:noFill/>
+              </a:ln>
+              <a:solidFill>
+                <a:schemeClr val="tx1"/>
+              </a:solidFill>
+              <a:effectLst/>
+              <a:latin typeface="Times New Roman" panose="02020603050405020304" pitchFamily="18" charset="0"/>
+              <a:cs typeface="Times New Roman" panose="02020603050405020304" pitchFamily="18" charset="0"/>
+            </a:endParaRPr>
+          </a:p>
+        </p:txBody>
+      </p:sp>
+      <p:sp>
+        <p:nvSpPr>
+          <p:cNvPr id="7" name="文字方塊 6"/>
+          <p:cNvSpPr txBox="1"/>
+          <p:nvPr/>
+        </p:nvSpPr>
+        <p:spPr>
+          <a:xfrm>
+            <a:off x="1649966" y="5528600"/>
+            <a:ext cx="389850" cy="338554"/>
+          </a:xfrm>
+          <a:prstGeom prst="rect">
+            <a:avLst/>
+          </a:prstGeom>
+          <a:noFill/>
+        </p:spPr>
+        <p:txBody>
+          <a:bodyPr wrap="none" rtlCol="0">
+            <a:spAutoFit/>
+          </a:bodyPr>
+          <a:lstStyle/>
+          <a:p>
+            <a:r>
+              <a:rPr lang="en-US" altLang="zh-TW" sz="1600" dirty="0">
+                <a:latin typeface="Times New Roman" panose="02020603050405020304" pitchFamily="18" charset="0"/>
+              </a:rPr>
+              <a:t>…</a:t>
+            </a:r>
+            <a:endParaRPr lang="zh-TW" altLang="en-US" sz="1600" dirty="0">
+              <a:latin typeface="Times New Roman" panose="02020603050405020304" pitchFamily="18" charset="0"/>
+            </a:endParaRPr>
+          </a:p>
+        </p:txBody>
+      </p:sp>
+      <p:grpSp>
+        <p:nvGrpSpPr>
+          <p:cNvPr id="12" name="群組 11"/>
+          <p:cNvGrpSpPr/>
+          <p:nvPr/>
+        </p:nvGrpSpPr>
+        <p:grpSpPr>
+          <a:xfrm>
+            <a:off x="2658794" y="3713870"/>
+            <a:ext cx="3756073" cy="2110154"/>
+            <a:chOff x="2715065" y="3615397"/>
+            <a:chExt cx="3756073" cy="2110154"/>
+          </a:xfrm>
+        </p:grpSpPr>
+        <p:sp>
+          <p:nvSpPr>
+            <p:cNvPr id="8" name="圓角矩形 7"/>
+            <p:cNvSpPr/>
+            <p:nvPr/>
+          </p:nvSpPr>
+          <p:spPr bwMode="auto">
+            <a:xfrm>
+              <a:off x="3587263" y="4192172"/>
+              <a:ext cx="2180492" cy="956601"/>
+            </a:xfrm>
+            <a:prstGeom prst="roundRect">
+              <a:avLst/>
+            </a:prstGeom>
+            <a:noFill/>
+            <a:ln w="9525" cap="flat" cmpd="sng" algn="ctr">
+              <a:solidFill>
+                <a:schemeClr val="tx1"/>
+              </a:solidFill>
+              <a:prstDash val="solid"/>
+              <a:round/>
+              <a:headEnd type="none" w="med" len="med"/>
+              <a:tailEnd type="none" w="med" len="med"/>
+            </a:ln>
+            <a:effectLst/>
+          </p:spPr>
+          <p:txBody>
+            <a:bodyPr rot="0" spcFirstLastPara="0" vertOverflow="overflow" horzOverflow="overflow" vert="horz" wrap="square" lIns="91440" tIns="45720" rIns="91440" bIns="45720" numCol="1" spcCol="0" rtlCol="0" fromWordArt="0" anchor="ctr" anchorCtr="0" forceAA="0" compatLnSpc="1">
+              <a:prstTxWarp prst="textNoShape">
+                <a:avLst/>
+              </a:prstTxWarp>
+              <a:noAutofit/>
+            </a:bodyPr>
+            <a:lstStyle/>
+            <a:p>
+              <a:pPr marL="0" marR="0" indent="0" algn="ctr" defTabSz="914400" rtl="0" eaLnBrk="0" fontAlgn="base" latinLnBrk="0" hangingPunct="0">
+                <a:lnSpc>
+                  <a:spcPct val="100000"/>
+                </a:lnSpc>
+                <a:spcBef>
+                  <a:spcPct val="0"/>
+                </a:spcBef>
+                <a:spcAft>
+                  <a:spcPct val="0"/>
+                </a:spcAft>
+                <a:buClrTx/>
+                <a:buSzTx/>
+                <a:buFontTx/>
+                <a:buNone/>
+                <a:tabLst/>
+              </a:pPr>
+              <a:endParaRPr kumimoji="0" lang="zh-TW" altLang="en-US" sz="1600" b="0" i="0" u="none" strike="noStrike" cap="none" normalizeH="0" baseline="0" dirty="0">
+                <a:ln>
+                  <a:noFill/>
+                </a:ln>
+                <a:solidFill>
+                  <a:schemeClr val="tx1"/>
+                </a:solidFill>
+                <a:effectLst/>
+                <a:latin typeface="Times New Roman" panose="02020603050405020304" pitchFamily="18" charset="0"/>
+                <a:cs typeface="Times New Roman" panose="02020603050405020304" pitchFamily="18" charset="0"/>
+              </a:endParaRPr>
+            </a:p>
+          </p:txBody>
+        </p:sp>
+        <p:sp>
+          <p:nvSpPr>
+            <p:cNvPr id="9" name="文字方塊 8"/>
+            <p:cNvSpPr txBox="1"/>
+            <p:nvPr/>
+          </p:nvSpPr>
+          <p:spPr>
+            <a:xfrm>
+              <a:off x="3770142" y="4331918"/>
+              <a:ext cx="707245" cy="338554"/>
+            </a:xfrm>
+            <a:prstGeom prst="rect">
+              <a:avLst/>
+            </a:prstGeom>
+            <a:noFill/>
+          </p:spPr>
+          <p:txBody>
+            <a:bodyPr wrap="none" rtlCol="0">
+              <a:spAutoFit/>
+            </a:bodyPr>
+            <a:lstStyle/>
+            <a:p>
+              <a:r>
+                <a:rPr lang="en-US" altLang="zh-TW" sz="1600" dirty="0">
+                  <a:latin typeface="Times New Roman" panose="02020603050405020304" pitchFamily="18" charset="0"/>
+                </a:rPr>
+                <a:t>ABC_</a:t>
+              </a:r>
+              <a:endParaRPr lang="zh-TW" altLang="en-US" sz="1600" dirty="0">
+                <a:latin typeface="Times New Roman" panose="02020603050405020304" pitchFamily="18" charset="0"/>
+              </a:endParaRPr>
+            </a:p>
+          </p:txBody>
+        </p:sp>
+        <p:sp>
+          <p:nvSpPr>
+            <p:cNvPr id="10" name="矩形 9"/>
+            <p:cNvSpPr/>
+            <p:nvPr/>
+          </p:nvSpPr>
+          <p:spPr bwMode="auto">
+            <a:xfrm>
+              <a:off x="2715065" y="3615397"/>
+              <a:ext cx="3756073" cy="2110154"/>
+            </a:xfrm>
+            <a:prstGeom prst="rect">
+              <a:avLst/>
+            </a:prstGeom>
+            <a:noFill/>
+            <a:ln w="9525" cap="flat" cmpd="sng" algn="ctr">
+              <a:solidFill>
+                <a:schemeClr val="tx1"/>
+              </a:solidFill>
+              <a:prstDash val="solid"/>
+              <a:round/>
+              <a:headEnd type="none" w="med" len="med"/>
+              <a:tailEnd type="none" w="med" len="med"/>
+            </a:ln>
+            <a:effectLst/>
+          </p:spPr>
+          <p:txBody>
+            <a:bodyPr rot="0" spcFirstLastPara="0" vertOverflow="overflow" horzOverflow="overflow" vert="horz" wrap="square" lIns="91440" tIns="45720" rIns="91440" bIns="45720" numCol="1" spcCol="0" rtlCol="0" fromWordArt="0" anchor="ctr" anchorCtr="0" forceAA="0" compatLnSpc="1">
+              <a:prstTxWarp prst="textNoShape">
+                <a:avLst/>
+              </a:prstTxWarp>
+              <a:noAutofit/>
+            </a:bodyPr>
+            <a:lstStyle/>
+            <a:p>
+              <a:pPr marL="0" marR="0" indent="0" algn="ctr" defTabSz="914400" rtl="0" eaLnBrk="0" fontAlgn="base" latinLnBrk="0" hangingPunct="0">
+                <a:lnSpc>
+                  <a:spcPct val="100000"/>
+                </a:lnSpc>
+                <a:spcBef>
+                  <a:spcPct val="0"/>
+                </a:spcBef>
+                <a:spcAft>
+                  <a:spcPct val="0"/>
+                </a:spcAft>
+                <a:buClrTx/>
+                <a:buSzTx/>
+                <a:buFontTx/>
+                <a:buNone/>
+                <a:tabLst/>
+              </a:pPr>
+              <a:endParaRPr kumimoji="0" lang="zh-TW" altLang="en-US" sz="1600" b="0" i="0" u="none" strike="noStrike" cap="none" normalizeH="0" baseline="0" dirty="0">
+                <a:ln>
+                  <a:noFill/>
+                </a:ln>
+                <a:solidFill>
+                  <a:schemeClr val="tx1"/>
+                </a:solidFill>
+                <a:effectLst/>
+                <a:latin typeface="Times New Roman" panose="02020603050405020304" pitchFamily="18" charset="0"/>
+                <a:cs typeface="Times New Roman" panose="02020603050405020304" pitchFamily="18" charset="0"/>
+              </a:endParaRPr>
+            </a:p>
+          </p:txBody>
+        </p:sp>
+      </p:grpSp>
+      <p:cxnSp>
+        <p:nvCxnSpPr>
+          <p:cNvPr id="14" name="直線單箭頭接點 13"/>
+          <p:cNvCxnSpPr>
+            <a:stCxn id="4" idx="6"/>
+          </p:cNvCxnSpPr>
+          <p:nvPr/>
+        </p:nvCxnSpPr>
+        <p:spPr bwMode="auto">
+          <a:xfrm flipV="1">
+            <a:off x="2110154" y="3988190"/>
+            <a:ext cx="590843" cy="1"/>
+          </a:xfrm>
+          <a:prstGeom prst="straightConnector1">
+            <a:avLst/>
+          </a:prstGeom>
+          <a:solidFill>
+            <a:schemeClr val="accent1"/>
+          </a:solidFill>
+          <a:ln w="9525" cap="flat" cmpd="sng" algn="ctr">
+            <a:solidFill>
+              <a:schemeClr val="tx1"/>
+            </a:solidFill>
+            <a:prstDash val="solid"/>
+            <a:round/>
+            <a:headEnd type="none" w="med" len="med"/>
+            <a:tailEnd type="triangle"/>
+          </a:ln>
+          <a:effectLst/>
+        </p:spPr>
+      </p:cxnSp>
+      <p:cxnSp>
+        <p:nvCxnSpPr>
+          <p:cNvPr id="16" name="直線單箭頭接點 15"/>
+          <p:cNvCxnSpPr>
+            <a:stCxn id="5" idx="6"/>
+          </p:cNvCxnSpPr>
+          <p:nvPr/>
+        </p:nvCxnSpPr>
+        <p:spPr bwMode="auto">
+          <a:xfrm flipV="1">
+            <a:off x="2110154" y="4564965"/>
+            <a:ext cx="548640" cy="1"/>
+          </a:xfrm>
+          <a:prstGeom prst="straightConnector1">
+            <a:avLst/>
+          </a:prstGeom>
+          <a:solidFill>
+            <a:schemeClr val="accent1"/>
+          </a:solidFill>
+          <a:ln w="9525" cap="flat" cmpd="sng" algn="ctr">
+            <a:solidFill>
+              <a:schemeClr val="tx1"/>
+            </a:solidFill>
+            <a:prstDash val="solid"/>
+            <a:round/>
+            <a:headEnd type="none" w="med" len="med"/>
+            <a:tailEnd type="triangle"/>
+          </a:ln>
+          <a:effectLst/>
+        </p:spPr>
+      </p:cxnSp>
+      <p:cxnSp>
+        <p:nvCxnSpPr>
+          <p:cNvPr id="18" name="直線單箭頭接點 17"/>
+          <p:cNvCxnSpPr>
+            <a:stCxn id="6" idx="6"/>
+          </p:cNvCxnSpPr>
+          <p:nvPr/>
+        </p:nvCxnSpPr>
+        <p:spPr bwMode="auto">
+          <a:xfrm flipV="1">
+            <a:off x="2110154" y="5148773"/>
+            <a:ext cx="548640" cy="1"/>
+          </a:xfrm>
+          <a:prstGeom prst="straightConnector1">
+            <a:avLst/>
+          </a:prstGeom>
+          <a:solidFill>
+            <a:schemeClr val="accent1"/>
+          </a:solidFill>
+          <a:ln w="9525" cap="flat" cmpd="sng" algn="ctr">
+            <a:solidFill>
+              <a:schemeClr val="tx1"/>
+            </a:solidFill>
+            <a:prstDash val="solid"/>
+            <a:round/>
+            <a:headEnd type="none" w="med" len="med"/>
+            <a:tailEnd type="triangle"/>
+          </a:ln>
+          <a:effectLst/>
+        </p:spPr>
+      </p:cxnSp>
+    </p:spTree>
+    <p:extLst>
+      <p:ext uri="{BB962C8B-B14F-4D97-AF65-F5344CB8AC3E}">
+        <p14:creationId xmlns:p14="http://schemas.microsoft.com/office/powerpoint/2010/main" val="1941335570"/>
+      </p:ext>
+    </p:extLst>
+  </p:cSld>
+  <p:clrMapOvr>
+    <a:masterClrMapping/>
+  </p:clrMapOvr>
+</p:sld>
+</file>
+
+<file path=ppt/slides/slide20.xml><?xml version="1.0" encoding="utf-8"?>
+<p:sld xmlns:a="http://schemas.openxmlformats.org/drawingml/2006/main" xmlns:r="http://schemas.openxmlformats.org/officeDocument/2006/relationships" xmlns:p="http://schemas.openxmlformats.org/presentationml/2006/main">
+  <p:cSld>
+    <p:spTree>
+      <p:nvGrpSpPr>
+        <p:cNvPr id="1" name=""/>
+        <p:cNvGrpSpPr/>
+        <p:nvPr/>
+      </p:nvGrpSpPr>
+      <p:grpSpPr>
+        <a:xfrm>
+          <a:off x="0" y="0"/>
+          <a:ext cx="0" cy="0"/>
+          <a:chOff x="0" y="0"/>
+          <a:chExt cx="0" cy="0"/>
+        </a:xfrm>
+      </p:grpSpPr>
+      <p:sp>
+        <p:nvSpPr>
+          <p:cNvPr id="2" name="標題 1"/>
+          <p:cNvSpPr>
+            <a:spLocks noGrp="1"/>
+          </p:cNvSpPr>
+          <p:nvPr>
+            <p:ph type="title"/>
+          </p:nvPr>
+        </p:nvSpPr>
+        <p:spPr/>
+        <p:txBody>
+          <a:bodyPr/>
+          <a:lstStyle/>
+          <a:p>
+            <a:r>
+              <a:rPr lang="en-US" altLang="zh-TW" dirty="0"/>
               <a:t>Program to send command/data</a:t>
             </a:r>
             <a:endParaRPr lang="zh-TW" altLang="en-US" dirty="0"/>
@@ -11582,13 +12272,13 @@
           <a:lstStyle/>
           <a:p>
             <a:r>
-              <a:rPr lang="en-US" altLang="zh-TW" sz="2400" dirty="0" smtClean="0"/>
+              <a:rPr lang="en-US" altLang="zh-TW" sz="2400" dirty="0"/>
               <a:t>Example: to send data ‘A’=0x41</a:t>
             </a:r>
           </a:p>
           <a:p>
             <a:r>
-              <a:rPr lang="en-US" altLang="zh-TW" sz="2400" dirty="0" smtClean="0"/>
+              <a:rPr lang="en-US" altLang="zh-TW" sz="2400" dirty="0"/>
               <a:t>The LCD prints ‘A’ at the cursor position</a:t>
             </a:r>
             <a:endParaRPr lang="zh-TW" altLang="en-US" sz="2400" dirty="0"/>
@@ -12258,7 +12948,7 @@
             <a:lstStyle/>
             <a:p>
               <a:r>
-                <a:rPr lang="en-US" altLang="zh-TW" sz="2000" dirty="0" smtClean="0">
+                <a:rPr lang="en-US" altLang="zh-TW" sz="2000" dirty="0">
                   <a:solidFill>
                     <a:srgbClr val="FF0000"/>
                   </a:solidFill>
@@ -12668,7 +13358,7 @@
           <a:lstStyle/>
           <a:p>
             <a:r>
-              <a:rPr lang="en-US" altLang="zh-TW" sz="1600" dirty="0" smtClean="0">
+              <a:rPr lang="en-US" altLang="zh-TW" sz="1600" dirty="0">
                 <a:solidFill>
                   <a:srgbClr val="FF0000"/>
                 </a:solidFill>
@@ -12695,17 +13385,148 @@
   <p:clrMapOvr>
     <a:masterClrMapping/>
   </p:clrMapOvr>
-  <p:timing>
-    <p:tnLst>
-      <p:par>
-        <p:cTn id="1" dur="indefinite" restart="never" nodeType="tmRoot"/>
-      </p:par>
-    </p:tnLst>
-  </p:timing>
 </p:sld>
 </file>
 
-<file path=ppt/slides/slide2.xml><?xml version="1.0" encoding="utf-8"?>
+<file path=ppt/slides/slide3.xml><?xml version="1.0" encoding="utf-8"?>
+<p:sld xmlns:a="http://schemas.openxmlformats.org/drawingml/2006/main" xmlns:r="http://schemas.openxmlformats.org/officeDocument/2006/relationships" xmlns:p="http://schemas.openxmlformats.org/presentationml/2006/main">
+  <p:cSld>
+    <p:spTree>
+      <p:nvGrpSpPr>
+        <p:cNvPr id="1" name=""/>
+        <p:cNvGrpSpPr/>
+        <p:nvPr/>
+      </p:nvGrpSpPr>
+      <p:grpSpPr>
+        <a:xfrm>
+          <a:off x="0" y="0"/>
+          <a:ext cx="0" cy="0"/>
+          <a:chOff x="0" y="0"/>
+          <a:chExt cx="0" cy="0"/>
+        </a:xfrm>
+      </p:grpSpPr>
+      <p:sp>
+        <p:nvSpPr>
+          <p:cNvPr id="57346" name="標題 1"/>
+          <p:cNvSpPr>
+            <a:spLocks noGrp="1"/>
+          </p:cNvSpPr>
+          <p:nvPr>
+            <p:ph type="title"/>
+          </p:nvPr>
+        </p:nvSpPr>
+        <p:spPr/>
+        <p:txBody>
+          <a:bodyPr/>
+          <a:lstStyle/>
+          <a:p>
+            <a:r>
+              <a:rPr lang="en-US" altLang="zh-TW"/>
+              <a:t>Pre-Lab Question</a:t>
+            </a:r>
+            <a:endParaRPr lang="zh-TW" altLang="en-US"/>
+          </a:p>
+        </p:txBody>
+      </p:sp>
+      <p:sp>
+        <p:nvSpPr>
+          <p:cNvPr id="57347" name="內容版面配置區 2"/>
+          <p:cNvSpPr>
+            <a:spLocks noGrp="1"/>
+          </p:cNvSpPr>
+          <p:nvPr>
+            <p:ph idx="1"/>
+          </p:nvPr>
+        </p:nvSpPr>
+        <p:spPr>
+          <a:xfrm>
+            <a:off x="457200" y="2017713"/>
+            <a:ext cx="8497888" cy="4114800"/>
+          </a:xfrm>
+        </p:spPr>
+        <p:txBody>
+          <a:bodyPr/>
+          <a:lstStyle/>
+          <a:p>
+            <a:r>
+              <a:rPr lang="en-US" altLang="zh-TW" sz="2800" dirty="0"/>
+              <a:t>Explain how to send a command/character to the LCD</a:t>
+            </a:r>
+          </a:p>
+          <a:p>
+            <a:pPr lvl="1"/>
+            <a:r>
+              <a:rPr lang="en-US" altLang="zh-TW" sz="2400" dirty="0"/>
+              <a:t>Show the timing waveform covering the following signals</a:t>
+            </a:r>
+          </a:p>
+          <a:p>
+            <a:pPr lvl="2"/>
+            <a:r>
+              <a:rPr lang="en-US" altLang="zh-TW" sz="2000" dirty="0"/>
+              <a:t>RS, RW, E, D [7:4]</a:t>
+            </a:r>
+          </a:p>
+          <a:p>
+            <a:pPr lvl="2"/>
+            <a:endParaRPr lang="en-US" altLang="zh-TW" sz="1600" dirty="0"/>
+          </a:p>
+          <a:p>
+            <a:r>
+              <a:rPr lang="en-US" altLang="zh-TW" sz="2000" dirty="0"/>
+              <a:t>Reference: </a:t>
+            </a:r>
+          </a:p>
+          <a:p>
+            <a:pPr lvl="1"/>
+            <a:r>
+              <a:rPr lang="en-US" altLang="zh-TW" sz="1800" dirty="0">
+                <a:hlinkClick r:id="rId2"/>
+              </a:rPr>
+              <a:t>http://www.8052.com/tutlcd.phtml</a:t>
+            </a:r>
+            <a:endParaRPr lang="en-US" altLang="zh-TW" sz="1800" dirty="0"/>
+          </a:p>
+          <a:p>
+            <a:pPr lvl="1"/>
+            <a:r>
+              <a:rPr lang="en-US" altLang="zh-TW" sz="1800" dirty="0">
+                <a:hlinkClick r:id="rId3"/>
+              </a:rPr>
+              <a:t>http://www.eeherald.com/section/design-guide/sample_lcd_c_programs.html</a:t>
+            </a:r>
+            <a:endParaRPr lang="en-US" altLang="zh-TW" sz="1800" dirty="0"/>
+          </a:p>
+          <a:p>
+            <a:pPr lvl="1"/>
+            <a:endParaRPr lang="en-US" altLang="zh-TW" sz="1800" dirty="0"/>
+          </a:p>
+          <a:p>
+            <a:r>
+              <a:rPr lang="en-US" altLang="zh-TW" sz="2200" dirty="0">
+                <a:solidFill>
+                  <a:srgbClr val="FF0000"/>
+                </a:solidFill>
+              </a:rPr>
+              <a:t>Explain in your own words!</a:t>
+            </a:r>
+            <a:endParaRPr lang="zh-TW" altLang="en-US" sz="2200" dirty="0">
+              <a:solidFill>
+                <a:srgbClr val="FF0000"/>
+              </a:solidFill>
+            </a:endParaRPr>
+          </a:p>
+        </p:txBody>
+      </p:sp>
+    </p:spTree>
+  </p:cSld>
+  <p:clrMapOvr>
+    <a:masterClrMapping/>
+  </p:clrMapOvr>
+</p:sld>
+</file>
+
+<file path=ppt/slides/slide4.xml><?xml version="1.0" encoding="utf-8"?>
 <p:sld xmlns:a="http://schemas.openxmlformats.org/drawingml/2006/main" xmlns:r="http://schemas.openxmlformats.org/officeDocument/2006/relationships" xmlns:p="http://schemas.openxmlformats.org/presentationml/2006/main">
   <p:cSld>
     <p:spTree>
@@ -12738,638 +13559,7 @@
           <a:lstStyle/>
           <a:p>
             <a:r>
-              <a:rPr lang="en-US" altLang="zh-TW" dirty="0" smtClean="0"/>
-              <a:t>Your Task</a:t>
-            </a:r>
-            <a:endParaRPr lang="zh-TW" altLang="en-US" dirty="0"/>
-          </a:p>
-        </p:txBody>
-      </p:sp>
-      <p:sp>
-        <p:nvSpPr>
-          <p:cNvPr id="3" name="內容版面配置區 2"/>
-          <p:cNvSpPr>
-            <a:spLocks noGrp="1"/>
-          </p:cNvSpPr>
-          <p:nvPr>
-            <p:ph idx="1"/>
-          </p:nvPr>
-        </p:nvSpPr>
-        <p:spPr>
-          <a:xfrm>
-            <a:off x="1182688" y="2017713"/>
-            <a:ext cx="7772400" cy="1189721"/>
-          </a:xfrm>
-        </p:spPr>
-        <p:txBody>
-          <a:bodyPr/>
-          <a:lstStyle/>
-          <a:p>
-            <a:r>
-              <a:rPr lang="en-US" altLang="zh-TW" dirty="0" smtClean="0"/>
-              <a:t>Display characters according to the button pressed</a:t>
-            </a:r>
-            <a:endParaRPr lang="zh-TW" altLang="en-US" dirty="0"/>
-          </a:p>
-        </p:txBody>
-      </p:sp>
-      <p:sp>
-        <p:nvSpPr>
-          <p:cNvPr id="4" name="橢圓 3"/>
-          <p:cNvSpPr/>
-          <p:nvPr/>
-        </p:nvSpPr>
-        <p:spPr bwMode="auto">
-          <a:xfrm>
-            <a:off x="1547446" y="3784209"/>
-            <a:ext cx="562708" cy="407963"/>
-          </a:xfrm>
-          <a:prstGeom prst="ellipse">
-            <a:avLst/>
-          </a:prstGeom>
-          <a:noFill/>
-          <a:ln w="9525" cap="flat" cmpd="sng" algn="ctr">
-            <a:solidFill>
-              <a:schemeClr val="tx1"/>
-            </a:solidFill>
-            <a:prstDash val="solid"/>
-            <a:round/>
-            <a:headEnd type="none" w="med" len="med"/>
-            <a:tailEnd type="none" w="med" len="med"/>
-          </a:ln>
-          <a:effectLst/>
-        </p:spPr>
-        <p:txBody>
-          <a:bodyPr rot="0" spcFirstLastPara="0" vertOverflow="overflow" horzOverflow="overflow" vert="horz" wrap="square" lIns="91440" tIns="45720" rIns="91440" bIns="45720" numCol="1" spcCol="0" rtlCol="0" fromWordArt="0" anchor="ctr" anchorCtr="0" forceAA="0" compatLnSpc="1">
-            <a:prstTxWarp prst="textNoShape">
-              <a:avLst/>
-            </a:prstTxWarp>
-            <a:noAutofit/>
-          </a:bodyPr>
-          <a:lstStyle/>
-          <a:p>
-            <a:pPr marL="0" marR="0" indent="0" algn="ctr" defTabSz="914400" rtl="0" eaLnBrk="0" fontAlgn="base" latinLnBrk="0" hangingPunct="0">
-              <a:lnSpc>
-                <a:spcPct val="100000"/>
-              </a:lnSpc>
-              <a:spcBef>
-                <a:spcPct val="0"/>
-              </a:spcBef>
-              <a:spcAft>
-                <a:spcPct val="0"/>
-              </a:spcAft>
-              <a:buClrTx/>
-              <a:buSzTx/>
-              <a:buFontTx/>
-              <a:buNone/>
-              <a:tabLst/>
-            </a:pPr>
-            <a:r>
-              <a:rPr kumimoji="0" lang="en-US" altLang="zh-TW" sz="1600" b="0" i="0" u="none" strike="noStrike" cap="none" normalizeH="0" baseline="0" dirty="0" smtClean="0">
-                <a:ln>
-                  <a:noFill/>
-                </a:ln>
-                <a:solidFill>
-                  <a:schemeClr val="tx1"/>
-                </a:solidFill>
-                <a:effectLst/>
-                <a:latin typeface="Times New Roman" panose="02020603050405020304" pitchFamily="18" charset="0"/>
-                <a:cs typeface="Times New Roman" panose="02020603050405020304" pitchFamily="18" charset="0"/>
-              </a:rPr>
-              <a:t>A</a:t>
-            </a:r>
-            <a:endParaRPr kumimoji="0" lang="zh-TW" altLang="en-US" sz="1600" b="0" i="0" u="none" strike="noStrike" cap="none" normalizeH="0" baseline="0" dirty="0" smtClean="0">
-              <a:ln>
-                <a:noFill/>
-              </a:ln>
-              <a:solidFill>
-                <a:schemeClr val="tx1"/>
-              </a:solidFill>
-              <a:effectLst/>
-              <a:latin typeface="Times New Roman" panose="02020603050405020304" pitchFamily="18" charset="0"/>
-              <a:cs typeface="Times New Roman" panose="02020603050405020304" pitchFamily="18" charset="0"/>
-            </a:endParaRPr>
-          </a:p>
-        </p:txBody>
-      </p:sp>
-      <p:sp>
-        <p:nvSpPr>
-          <p:cNvPr id="5" name="橢圓 4"/>
-          <p:cNvSpPr/>
-          <p:nvPr/>
-        </p:nvSpPr>
-        <p:spPr bwMode="auto">
-          <a:xfrm>
-            <a:off x="1547446" y="4360984"/>
-            <a:ext cx="562708" cy="407963"/>
-          </a:xfrm>
-          <a:prstGeom prst="ellipse">
-            <a:avLst/>
-          </a:prstGeom>
-          <a:noFill/>
-          <a:ln w="9525" cap="flat" cmpd="sng" algn="ctr">
-            <a:solidFill>
-              <a:schemeClr val="tx1"/>
-            </a:solidFill>
-            <a:prstDash val="solid"/>
-            <a:round/>
-            <a:headEnd type="none" w="med" len="med"/>
-            <a:tailEnd type="none" w="med" len="med"/>
-          </a:ln>
-          <a:effectLst/>
-        </p:spPr>
-        <p:txBody>
-          <a:bodyPr rot="0" spcFirstLastPara="0" vertOverflow="overflow" horzOverflow="overflow" vert="horz" wrap="square" lIns="91440" tIns="45720" rIns="91440" bIns="45720" numCol="1" spcCol="0" rtlCol="0" fromWordArt="0" anchor="ctr" anchorCtr="0" forceAA="0" compatLnSpc="1">
-            <a:prstTxWarp prst="textNoShape">
-              <a:avLst/>
-            </a:prstTxWarp>
-            <a:noAutofit/>
-          </a:bodyPr>
-          <a:lstStyle/>
-          <a:p>
-            <a:pPr marL="0" marR="0" indent="0" algn="ctr" defTabSz="914400" rtl="0" eaLnBrk="0" fontAlgn="base" latinLnBrk="0" hangingPunct="0">
-              <a:lnSpc>
-                <a:spcPct val="100000"/>
-              </a:lnSpc>
-              <a:spcBef>
-                <a:spcPct val="0"/>
-              </a:spcBef>
-              <a:spcAft>
-                <a:spcPct val="0"/>
-              </a:spcAft>
-              <a:buClrTx/>
-              <a:buSzTx/>
-              <a:buFontTx/>
-              <a:buNone/>
-              <a:tabLst/>
-            </a:pPr>
-            <a:r>
-              <a:rPr kumimoji="0" lang="en-US" altLang="zh-TW" sz="1600" b="0" i="0" u="none" strike="noStrike" cap="none" normalizeH="0" baseline="0" dirty="0" smtClean="0">
-                <a:ln>
-                  <a:noFill/>
-                </a:ln>
-                <a:solidFill>
-                  <a:schemeClr val="tx1"/>
-                </a:solidFill>
-                <a:effectLst/>
-                <a:latin typeface="Times New Roman" panose="02020603050405020304" pitchFamily="18" charset="0"/>
-                <a:cs typeface="Times New Roman" panose="02020603050405020304" pitchFamily="18" charset="0"/>
-              </a:rPr>
-              <a:t>B</a:t>
-            </a:r>
-            <a:endParaRPr kumimoji="0" lang="zh-TW" altLang="en-US" sz="1600" b="0" i="0" u="none" strike="noStrike" cap="none" normalizeH="0" baseline="0" dirty="0" smtClean="0">
-              <a:ln>
-                <a:noFill/>
-              </a:ln>
-              <a:solidFill>
-                <a:schemeClr val="tx1"/>
-              </a:solidFill>
-              <a:effectLst/>
-              <a:latin typeface="Times New Roman" panose="02020603050405020304" pitchFamily="18" charset="0"/>
-              <a:cs typeface="Times New Roman" panose="02020603050405020304" pitchFamily="18" charset="0"/>
-            </a:endParaRPr>
-          </a:p>
-        </p:txBody>
-      </p:sp>
-      <p:sp>
-        <p:nvSpPr>
-          <p:cNvPr id="6" name="橢圓 5"/>
-          <p:cNvSpPr/>
-          <p:nvPr/>
-        </p:nvSpPr>
-        <p:spPr bwMode="auto">
-          <a:xfrm>
-            <a:off x="1547446" y="4944792"/>
-            <a:ext cx="562708" cy="407963"/>
-          </a:xfrm>
-          <a:prstGeom prst="ellipse">
-            <a:avLst/>
-          </a:prstGeom>
-          <a:noFill/>
-          <a:ln w="9525" cap="flat" cmpd="sng" algn="ctr">
-            <a:solidFill>
-              <a:schemeClr val="tx1"/>
-            </a:solidFill>
-            <a:prstDash val="solid"/>
-            <a:round/>
-            <a:headEnd type="none" w="med" len="med"/>
-            <a:tailEnd type="none" w="med" len="med"/>
-          </a:ln>
-          <a:effectLst/>
-        </p:spPr>
-        <p:txBody>
-          <a:bodyPr rot="0" spcFirstLastPara="0" vertOverflow="overflow" horzOverflow="overflow" vert="horz" wrap="square" lIns="91440" tIns="45720" rIns="91440" bIns="45720" numCol="1" spcCol="0" rtlCol="0" fromWordArt="0" anchor="ctr" anchorCtr="0" forceAA="0" compatLnSpc="1">
-            <a:prstTxWarp prst="textNoShape">
-              <a:avLst/>
-            </a:prstTxWarp>
-            <a:noAutofit/>
-          </a:bodyPr>
-          <a:lstStyle/>
-          <a:p>
-            <a:pPr marL="0" marR="0" indent="0" algn="ctr" defTabSz="914400" rtl="0" eaLnBrk="0" fontAlgn="base" latinLnBrk="0" hangingPunct="0">
-              <a:lnSpc>
-                <a:spcPct val="100000"/>
-              </a:lnSpc>
-              <a:spcBef>
-                <a:spcPct val="0"/>
-              </a:spcBef>
-              <a:spcAft>
-                <a:spcPct val="0"/>
-              </a:spcAft>
-              <a:buClrTx/>
-              <a:buSzTx/>
-              <a:buFontTx/>
-              <a:buNone/>
-              <a:tabLst/>
-            </a:pPr>
-            <a:r>
-              <a:rPr kumimoji="0" lang="en-US" altLang="zh-TW" sz="1600" b="0" i="0" u="none" strike="noStrike" cap="none" normalizeH="0" baseline="0" dirty="0" smtClean="0">
-                <a:ln>
-                  <a:noFill/>
-                </a:ln>
-                <a:solidFill>
-                  <a:schemeClr val="tx1"/>
-                </a:solidFill>
-                <a:effectLst/>
-                <a:latin typeface="Times New Roman" panose="02020603050405020304" pitchFamily="18" charset="0"/>
-                <a:cs typeface="Times New Roman" panose="02020603050405020304" pitchFamily="18" charset="0"/>
-              </a:rPr>
-              <a:t>C</a:t>
-            </a:r>
-            <a:endParaRPr kumimoji="0" lang="zh-TW" altLang="en-US" sz="1600" b="0" i="0" u="none" strike="noStrike" cap="none" normalizeH="0" baseline="0" dirty="0" smtClean="0">
-              <a:ln>
-                <a:noFill/>
-              </a:ln>
-              <a:solidFill>
-                <a:schemeClr val="tx1"/>
-              </a:solidFill>
-              <a:effectLst/>
-              <a:latin typeface="Times New Roman" panose="02020603050405020304" pitchFamily="18" charset="0"/>
-              <a:cs typeface="Times New Roman" panose="02020603050405020304" pitchFamily="18" charset="0"/>
-            </a:endParaRPr>
-          </a:p>
-        </p:txBody>
-      </p:sp>
-      <p:sp>
-        <p:nvSpPr>
-          <p:cNvPr id="7" name="文字方塊 6"/>
-          <p:cNvSpPr txBox="1"/>
-          <p:nvPr/>
-        </p:nvSpPr>
-        <p:spPr>
-          <a:xfrm>
-            <a:off x="1649966" y="5528600"/>
-            <a:ext cx="389850" cy="338554"/>
-          </a:xfrm>
-          <a:prstGeom prst="rect">
-            <a:avLst/>
-          </a:prstGeom>
-          <a:noFill/>
-        </p:spPr>
-        <p:txBody>
-          <a:bodyPr wrap="none" rtlCol="0">
-            <a:spAutoFit/>
-          </a:bodyPr>
-          <a:lstStyle/>
-          <a:p>
-            <a:r>
-              <a:rPr lang="en-US" altLang="zh-TW" sz="1600" dirty="0" smtClean="0">
-                <a:latin typeface="Times New Roman" panose="02020603050405020304" pitchFamily="18" charset="0"/>
-              </a:rPr>
-              <a:t>…</a:t>
-            </a:r>
-            <a:endParaRPr lang="zh-TW" altLang="en-US" sz="1600" dirty="0" smtClean="0">
-              <a:latin typeface="Times New Roman" panose="02020603050405020304" pitchFamily="18" charset="0"/>
-            </a:endParaRPr>
-          </a:p>
-        </p:txBody>
-      </p:sp>
-      <p:grpSp>
-        <p:nvGrpSpPr>
-          <p:cNvPr id="12" name="群組 11"/>
-          <p:cNvGrpSpPr/>
-          <p:nvPr/>
-        </p:nvGrpSpPr>
-        <p:grpSpPr>
-          <a:xfrm>
-            <a:off x="2658794" y="3713870"/>
-            <a:ext cx="3756073" cy="2110154"/>
-            <a:chOff x="2715065" y="3615397"/>
-            <a:chExt cx="3756073" cy="2110154"/>
-          </a:xfrm>
-        </p:grpSpPr>
-        <p:sp>
-          <p:nvSpPr>
-            <p:cNvPr id="8" name="圓角矩形 7"/>
-            <p:cNvSpPr/>
-            <p:nvPr/>
-          </p:nvSpPr>
-          <p:spPr bwMode="auto">
-            <a:xfrm>
-              <a:off x="3587263" y="4192172"/>
-              <a:ext cx="2180492" cy="956601"/>
-            </a:xfrm>
-            <a:prstGeom prst="roundRect">
-              <a:avLst/>
-            </a:prstGeom>
-            <a:noFill/>
-            <a:ln w="9525" cap="flat" cmpd="sng" algn="ctr">
-              <a:solidFill>
-                <a:schemeClr val="tx1"/>
-              </a:solidFill>
-              <a:prstDash val="solid"/>
-              <a:round/>
-              <a:headEnd type="none" w="med" len="med"/>
-              <a:tailEnd type="none" w="med" len="med"/>
-            </a:ln>
-            <a:effectLst/>
-          </p:spPr>
-          <p:txBody>
-            <a:bodyPr rot="0" spcFirstLastPara="0" vertOverflow="overflow" horzOverflow="overflow" vert="horz" wrap="square" lIns="91440" tIns="45720" rIns="91440" bIns="45720" numCol="1" spcCol="0" rtlCol="0" fromWordArt="0" anchor="ctr" anchorCtr="0" forceAA="0" compatLnSpc="1">
-              <a:prstTxWarp prst="textNoShape">
-                <a:avLst/>
-              </a:prstTxWarp>
-              <a:noAutofit/>
-            </a:bodyPr>
-            <a:lstStyle/>
-            <a:p>
-              <a:pPr marL="0" marR="0" indent="0" algn="ctr" defTabSz="914400" rtl="0" eaLnBrk="0" fontAlgn="base" latinLnBrk="0" hangingPunct="0">
-                <a:lnSpc>
-                  <a:spcPct val="100000"/>
-                </a:lnSpc>
-                <a:spcBef>
-                  <a:spcPct val="0"/>
-                </a:spcBef>
-                <a:spcAft>
-                  <a:spcPct val="0"/>
-                </a:spcAft>
-                <a:buClrTx/>
-                <a:buSzTx/>
-                <a:buFontTx/>
-                <a:buNone/>
-                <a:tabLst/>
-              </a:pPr>
-              <a:endParaRPr kumimoji="0" lang="zh-TW" altLang="en-US" sz="1600" b="0" i="0" u="none" strike="noStrike" cap="none" normalizeH="0" baseline="0" dirty="0" smtClean="0">
-                <a:ln>
-                  <a:noFill/>
-                </a:ln>
-                <a:solidFill>
-                  <a:schemeClr val="tx1"/>
-                </a:solidFill>
-                <a:effectLst/>
-                <a:latin typeface="Times New Roman" panose="02020603050405020304" pitchFamily="18" charset="0"/>
-                <a:cs typeface="Times New Roman" panose="02020603050405020304" pitchFamily="18" charset="0"/>
-              </a:endParaRPr>
-            </a:p>
-          </p:txBody>
-        </p:sp>
-        <p:sp>
-          <p:nvSpPr>
-            <p:cNvPr id="9" name="文字方塊 8"/>
-            <p:cNvSpPr txBox="1"/>
-            <p:nvPr/>
-          </p:nvSpPr>
-          <p:spPr>
-            <a:xfrm>
-              <a:off x="3770142" y="4331918"/>
-              <a:ext cx="707245" cy="338554"/>
-            </a:xfrm>
-            <a:prstGeom prst="rect">
-              <a:avLst/>
-            </a:prstGeom>
-            <a:noFill/>
-          </p:spPr>
-          <p:txBody>
-            <a:bodyPr wrap="none" rtlCol="0">
-              <a:spAutoFit/>
-            </a:bodyPr>
-            <a:lstStyle/>
-            <a:p>
-              <a:r>
-                <a:rPr lang="en-US" altLang="zh-TW" sz="1600" dirty="0" smtClean="0">
-                  <a:latin typeface="Times New Roman" panose="02020603050405020304" pitchFamily="18" charset="0"/>
-                </a:rPr>
-                <a:t>ABC_</a:t>
-              </a:r>
-              <a:endParaRPr lang="zh-TW" altLang="en-US" sz="1600" dirty="0" smtClean="0">
-                <a:latin typeface="Times New Roman" panose="02020603050405020304" pitchFamily="18" charset="0"/>
-              </a:endParaRPr>
-            </a:p>
-          </p:txBody>
-        </p:sp>
-        <p:sp>
-          <p:nvSpPr>
-            <p:cNvPr id="10" name="矩形 9"/>
-            <p:cNvSpPr/>
-            <p:nvPr/>
-          </p:nvSpPr>
-          <p:spPr bwMode="auto">
-            <a:xfrm>
-              <a:off x="2715065" y="3615397"/>
-              <a:ext cx="3756073" cy="2110154"/>
-            </a:xfrm>
-            <a:prstGeom prst="rect">
-              <a:avLst/>
-            </a:prstGeom>
-            <a:noFill/>
-            <a:ln w="9525" cap="flat" cmpd="sng" algn="ctr">
-              <a:solidFill>
-                <a:schemeClr val="tx1"/>
-              </a:solidFill>
-              <a:prstDash val="solid"/>
-              <a:round/>
-              <a:headEnd type="none" w="med" len="med"/>
-              <a:tailEnd type="none" w="med" len="med"/>
-            </a:ln>
-            <a:effectLst/>
-          </p:spPr>
-          <p:txBody>
-            <a:bodyPr rot="0" spcFirstLastPara="0" vertOverflow="overflow" horzOverflow="overflow" vert="horz" wrap="square" lIns="91440" tIns="45720" rIns="91440" bIns="45720" numCol="1" spcCol="0" rtlCol="0" fromWordArt="0" anchor="ctr" anchorCtr="0" forceAA="0" compatLnSpc="1">
-              <a:prstTxWarp prst="textNoShape">
-                <a:avLst/>
-              </a:prstTxWarp>
-              <a:noAutofit/>
-            </a:bodyPr>
-            <a:lstStyle/>
-            <a:p>
-              <a:pPr marL="0" marR="0" indent="0" algn="ctr" defTabSz="914400" rtl="0" eaLnBrk="0" fontAlgn="base" latinLnBrk="0" hangingPunct="0">
-                <a:lnSpc>
-                  <a:spcPct val="100000"/>
-                </a:lnSpc>
-                <a:spcBef>
-                  <a:spcPct val="0"/>
-                </a:spcBef>
-                <a:spcAft>
-                  <a:spcPct val="0"/>
-                </a:spcAft>
-                <a:buClrTx/>
-                <a:buSzTx/>
-                <a:buFontTx/>
-                <a:buNone/>
-                <a:tabLst/>
-              </a:pPr>
-              <a:endParaRPr kumimoji="0" lang="zh-TW" altLang="en-US" sz="1600" b="0" i="0" u="none" strike="noStrike" cap="none" normalizeH="0" baseline="0" dirty="0" smtClean="0">
-                <a:ln>
-                  <a:noFill/>
-                </a:ln>
-                <a:solidFill>
-                  <a:schemeClr val="tx1"/>
-                </a:solidFill>
-                <a:effectLst/>
-                <a:latin typeface="Times New Roman" panose="02020603050405020304" pitchFamily="18" charset="0"/>
-                <a:cs typeface="Times New Roman" panose="02020603050405020304" pitchFamily="18" charset="0"/>
-              </a:endParaRPr>
-            </a:p>
-          </p:txBody>
-        </p:sp>
-      </p:grpSp>
-      <p:cxnSp>
-        <p:nvCxnSpPr>
-          <p:cNvPr id="14" name="直線單箭頭接點 13"/>
-          <p:cNvCxnSpPr>
-            <a:stCxn id="4" idx="6"/>
-          </p:cNvCxnSpPr>
-          <p:nvPr/>
-        </p:nvCxnSpPr>
-        <p:spPr bwMode="auto">
-          <a:xfrm flipV="1">
-            <a:off x="2110154" y="3988190"/>
-            <a:ext cx="590843" cy="1"/>
-          </a:xfrm>
-          <a:prstGeom prst="straightConnector1">
-            <a:avLst/>
-          </a:prstGeom>
-          <a:solidFill>
-            <a:schemeClr val="accent1"/>
-          </a:solidFill>
-          <a:ln w="9525" cap="flat" cmpd="sng" algn="ctr">
-            <a:solidFill>
-              <a:schemeClr val="tx1"/>
-            </a:solidFill>
-            <a:prstDash val="solid"/>
-            <a:round/>
-            <a:headEnd type="none" w="med" len="med"/>
-            <a:tailEnd type="triangle"/>
-          </a:ln>
-          <a:effectLst/>
-        </p:spPr>
-      </p:cxnSp>
-      <p:cxnSp>
-        <p:nvCxnSpPr>
-          <p:cNvPr id="16" name="直線單箭頭接點 15"/>
-          <p:cNvCxnSpPr>
-            <a:stCxn id="5" idx="6"/>
-          </p:cNvCxnSpPr>
-          <p:nvPr/>
-        </p:nvCxnSpPr>
-        <p:spPr bwMode="auto">
-          <a:xfrm flipV="1">
-            <a:off x="2110154" y="4564965"/>
-            <a:ext cx="548640" cy="1"/>
-          </a:xfrm>
-          <a:prstGeom prst="straightConnector1">
-            <a:avLst/>
-          </a:prstGeom>
-          <a:solidFill>
-            <a:schemeClr val="accent1"/>
-          </a:solidFill>
-          <a:ln w="9525" cap="flat" cmpd="sng" algn="ctr">
-            <a:solidFill>
-              <a:schemeClr val="tx1"/>
-            </a:solidFill>
-            <a:prstDash val="solid"/>
-            <a:round/>
-            <a:headEnd type="none" w="med" len="med"/>
-            <a:tailEnd type="triangle"/>
-          </a:ln>
-          <a:effectLst/>
-        </p:spPr>
-      </p:cxnSp>
-      <p:cxnSp>
-        <p:nvCxnSpPr>
-          <p:cNvPr id="18" name="直線單箭頭接點 17"/>
-          <p:cNvCxnSpPr>
-            <a:stCxn id="6" idx="6"/>
-          </p:cNvCxnSpPr>
-          <p:nvPr/>
-        </p:nvCxnSpPr>
-        <p:spPr bwMode="auto">
-          <a:xfrm flipV="1">
-            <a:off x="2110154" y="5148773"/>
-            <a:ext cx="548640" cy="1"/>
-          </a:xfrm>
-          <a:prstGeom prst="straightConnector1">
-            <a:avLst/>
-          </a:prstGeom>
-          <a:solidFill>
-            <a:schemeClr val="accent1"/>
-          </a:solidFill>
-          <a:ln w="9525" cap="flat" cmpd="sng" algn="ctr">
-            <a:solidFill>
-              <a:schemeClr val="tx1"/>
-            </a:solidFill>
-            <a:prstDash val="solid"/>
-            <a:round/>
-            <a:headEnd type="none" w="med" len="med"/>
-            <a:tailEnd type="triangle"/>
-          </a:ln>
-          <a:effectLst/>
-        </p:spPr>
-      </p:cxnSp>
-    </p:spTree>
-    <p:extLst>
-      <p:ext uri="{BB962C8B-B14F-4D97-AF65-F5344CB8AC3E}">
-        <p14:creationId xmlns:p14="http://schemas.microsoft.com/office/powerpoint/2010/main" val="1941335570"/>
-      </p:ext>
-    </p:extLst>
-  </p:cSld>
-  <p:clrMapOvr>
-    <a:masterClrMapping/>
-  </p:clrMapOvr>
-  <p:timing>
-    <p:tnLst>
-      <p:par>
-        <p:cTn id="1" dur="indefinite" restart="never" nodeType="tmRoot"/>
-      </p:par>
-    </p:tnLst>
-  </p:timing>
-</p:sld>
-</file>
-
-<file path=ppt/slides/slide3.xml><?xml version="1.0" encoding="utf-8"?>
-<p:sld xmlns:a="http://schemas.openxmlformats.org/drawingml/2006/main" xmlns:r="http://schemas.openxmlformats.org/officeDocument/2006/relationships" xmlns:p="http://schemas.openxmlformats.org/presentationml/2006/main">
-  <p:cSld>
-    <p:spTree>
-      <p:nvGrpSpPr>
-        <p:cNvPr id="1" name=""/>
-        <p:cNvGrpSpPr/>
-        <p:nvPr/>
-      </p:nvGrpSpPr>
-      <p:grpSpPr>
-        <a:xfrm>
-          <a:off x="0" y="0"/>
-          <a:ext cx="0" cy="0"/>
-          <a:chOff x="0" y="0"/>
-          <a:chExt cx="0" cy="0"/>
-        </a:xfrm>
-      </p:grpSpPr>
-      <p:sp>
-        <p:nvSpPr>
-          <p:cNvPr id="2" name="標題 1"/>
-          <p:cNvSpPr>
-            <a:spLocks noGrp="1"/>
-          </p:cNvSpPr>
-          <p:nvPr>
-            <p:ph type="title"/>
-          </p:nvPr>
-        </p:nvSpPr>
-        <p:spPr/>
-        <p:txBody>
-          <a:bodyPr/>
-          <a:lstStyle/>
-          <a:p>
-            <a:r>
-              <a:rPr lang="en-US" altLang="zh-TW" dirty="0" smtClean="0"/>
+              <a:rPr lang="en-US" altLang="zh-TW" dirty="0"/>
               <a:t>Grading</a:t>
             </a:r>
             <a:endParaRPr lang="zh-TW" altLang="en-US" dirty="0"/>
@@ -13397,41 +13587,41 @@
           <a:lstStyle/>
           <a:p>
             <a:r>
-              <a:rPr lang="en-US" altLang="zh-TW" sz="2000" dirty="0" smtClean="0"/>
+              <a:rPr lang="en-US" altLang="zh-TW" sz="2000" dirty="0"/>
               <a:t>Basic: (60%)</a:t>
             </a:r>
           </a:p>
           <a:p>
             <a:pPr lvl="1"/>
             <a:r>
-              <a:rPr lang="en-US" altLang="zh-TW" sz="1800" dirty="0" smtClean="0"/>
+              <a:rPr lang="en-US" altLang="zh-TW" sz="1800" dirty="0"/>
               <a:t>Display the character pressed at the cursor position</a:t>
             </a:r>
           </a:p>
           <a:p>
             <a:r>
-              <a:rPr lang="en-US" altLang="zh-TW" sz="2000" dirty="0" smtClean="0"/>
+              <a:rPr lang="en-US" altLang="zh-TW" sz="2000" dirty="0"/>
               <a:t>Bonus 1: (+10%)</a:t>
             </a:r>
           </a:p>
           <a:p>
             <a:pPr lvl="1"/>
             <a:r>
-              <a:rPr lang="en-US" altLang="zh-TW" sz="1800" dirty="0" smtClean="0"/>
+              <a:rPr lang="en-US" altLang="zh-TW" sz="1800" dirty="0"/>
               <a:t>Implement the `new-line’ key</a:t>
             </a:r>
           </a:p>
           <a:p>
             <a:pPr lvl="1"/>
             <a:r>
-              <a:rPr lang="en-US" altLang="zh-TW" sz="1800" dirty="0" smtClean="0"/>
+              <a:rPr lang="en-US" altLang="zh-TW" sz="1800" dirty="0"/>
               <a:t>Change to the next line if new-line pressed at Line 1</a:t>
             </a:r>
           </a:p>
           <a:p>
             <a:pPr lvl="1"/>
             <a:r>
-              <a:rPr lang="en-US" altLang="zh-TW" sz="1800" dirty="0" smtClean="0">
+              <a:rPr lang="en-US" altLang="zh-TW" sz="1800" dirty="0">
                 <a:solidFill>
                   <a:srgbClr val="FF0000"/>
                 </a:solidFill>
@@ -13439,34 +13629,34 @@
               <a:t>Scroll</a:t>
             </a:r>
             <a:r>
-              <a:rPr lang="en-US" altLang="zh-TW" sz="1800" dirty="0" smtClean="0"/>
+              <a:rPr lang="en-US" altLang="zh-TW" sz="1800" dirty="0"/>
               <a:t> the screen if new-line pressed at Line 2</a:t>
             </a:r>
           </a:p>
           <a:p>
             <a:r>
-              <a:rPr lang="en-US" altLang="zh-TW" sz="2000" dirty="0" smtClean="0"/>
+              <a:rPr lang="en-US" altLang="zh-TW" sz="2000" dirty="0"/>
               <a:t>Bonus 2: (+20%)</a:t>
             </a:r>
           </a:p>
           <a:p>
             <a:pPr lvl="1"/>
             <a:r>
-              <a:rPr lang="en-US" altLang="zh-TW" sz="1800" dirty="0" smtClean="0"/>
+              <a:rPr lang="en-US" altLang="zh-TW" sz="1800" dirty="0"/>
               <a:t>Implement the arrow keys (up, down, left, right)</a:t>
             </a:r>
           </a:p>
           <a:p>
             <a:pPr lvl="1"/>
             <a:r>
-              <a:rPr lang="en-US" altLang="zh-TW" sz="1800" dirty="0" smtClean="0"/>
+              <a:rPr lang="en-US" altLang="zh-TW" sz="1800" dirty="0"/>
               <a:t>Move the cursor by the arrow key</a:t>
             </a:r>
           </a:p>
           <a:p>
             <a:pPr lvl="1"/>
             <a:r>
-              <a:rPr lang="en-US" altLang="zh-TW" sz="1800" dirty="0" smtClean="0">
+              <a:rPr lang="en-US" altLang="zh-TW" sz="1800" dirty="0">
                 <a:solidFill>
                   <a:srgbClr val="FF0000"/>
                 </a:solidFill>
@@ -13474,20 +13664,20 @@
               <a:t>Insert</a:t>
             </a:r>
             <a:r>
-              <a:rPr lang="en-US" altLang="zh-TW" sz="1800" dirty="0" smtClean="0"/>
+              <a:rPr lang="en-US" altLang="zh-TW" sz="1800" dirty="0"/>
               <a:t> character at the cursor position</a:t>
             </a:r>
           </a:p>
           <a:p>
             <a:r>
-              <a:rPr lang="en-US" altLang="zh-TW" sz="2200" dirty="0" smtClean="0"/>
+              <a:rPr lang="en-US" altLang="zh-TW" sz="2200" dirty="0"/>
               <a:t>Bonus 3: (+20%)</a:t>
             </a:r>
           </a:p>
           <a:p>
             <a:pPr lvl="1"/>
             <a:r>
-              <a:rPr lang="en-US" altLang="zh-TW" sz="1800" dirty="0" smtClean="0"/>
+              <a:rPr lang="en-US" altLang="zh-TW" sz="1800" dirty="0"/>
               <a:t>Catch the signal waveform of sending a command/data using LA</a:t>
             </a:r>
           </a:p>
@@ -13503,17 +13693,10 @@
   <p:clrMapOvr>
     <a:masterClrMapping/>
   </p:clrMapOvr>
-  <p:timing>
-    <p:tnLst>
-      <p:par>
-        <p:cTn id="1" dur="indefinite" restart="never" nodeType="tmRoot"/>
-      </p:par>
-    </p:tnLst>
-  </p:timing>
 </p:sld>
 </file>
 
-<file path=ppt/slides/slide4.xml><?xml version="1.0" encoding="utf-8"?>
+<file path=ppt/slides/slide5.xml><?xml version="1.0" encoding="utf-8"?>
 <p:sld xmlns:a="http://schemas.openxmlformats.org/drawingml/2006/main" xmlns:r="http://schemas.openxmlformats.org/officeDocument/2006/relationships" xmlns:p="http://schemas.openxmlformats.org/presentationml/2006/main">
   <p:cSld>
     <p:spTree>
@@ -13546,7 +13729,7 @@
           <a:lstStyle/>
           <a:p>
             <a:r>
-              <a:rPr lang="en-US" altLang="zh-TW" dirty="0" smtClean="0"/>
+              <a:rPr lang="en-US" altLang="zh-TW" dirty="0"/>
               <a:t>General Concepts: Controlling I/O Devices</a:t>
             </a:r>
             <a:endParaRPr lang="zh-TW" altLang="en-US" dirty="0"/>
@@ -13569,7 +13752,7 @@
           <a:lstStyle/>
           <a:p>
             <a:r>
-              <a:rPr lang="en-US" altLang="zh-TW" dirty="0" smtClean="0"/>
+              <a:rPr lang="en-US" altLang="zh-TW" dirty="0"/>
               <a:t>On-chip vs. off-chip</a:t>
             </a:r>
             <a:endParaRPr lang="zh-TW" altLang="en-US" dirty="0"/>
@@ -13586,17 +13769,10 @@
   <p:clrMapOvr>
     <a:masterClrMapping/>
   </p:clrMapOvr>
-  <p:timing>
-    <p:tnLst>
-      <p:par>
-        <p:cTn id="1" dur="indefinite" restart="never" nodeType="tmRoot"/>
-      </p:par>
-    </p:tnLst>
-  </p:timing>
 </p:sld>
 </file>
 
-<file path=ppt/slides/slide5.xml><?xml version="1.0" encoding="utf-8"?>
+<file path=ppt/slides/slide6.xml><?xml version="1.0" encoding="utf-8"?>
 <p:sld xmlns:a="http://schemas.openxmlformats.org/drawingml/2006/main" xmlns:r="http://schemas.openxmlformats.org/officeDocument/2006/relationships" xmlns:p="http://schemas.openxmlformats.org/presentationml/2006/main">
   <p:cSld>
     <p:spTree>
@@ -13629,10 +13805,10 @@
           <a:lstStyle/>
           <a:p>
             <a:r>
-              <a:rPr lang="en-US" altLang="zh-TW" dirty="0" smtClean="0"/>
+              <a:rPr lang="en-US" altLang="zh-TW" dirty="0"/>
               <a:t>Control on-chip peripherals</a:t>
             </a:r>
-            <a:endParaRPr lang="zh-TW" altLang="en-US" dirty="0" smtClean="0"/>
+            <a:endParaRPr lang="zh-TW" altLang="en-US" dirty="0"/>
           </a:p>
         </p:txBody>
       </p:sp>
@@ -13657,10 +13833,10 @@
           <a:lstStyle/>
           <a:p>
             <a:r>
-              <a:rPr lang="en-US" altLang="zh-TW" sz="2800" dirty="0" smtClean="0"/>
+              <a:rPr lang="en-US" altLang="zh-TW" sz="2800" dirty="0"/>
               <a:t>access control registers with memory-mapped I/O</a:t>
             </a:r>
-            <a:endParaRPr lang="zh-TW" altLang="en-US" sz="2800" dirty="0" smtClean="0"/>
+            <a:endParaRPr lang="zh-TW" altLang="en-US" sz="2800" dirty="0"/>
           </a:p>
         </p:txBody>
       </p:sp>
@@ -17362,17 +17538,10 @@
   <p:clrMapOvr>
     <a:masterClrMapping/>
   </p:clrMapOvr>
-  <p:timing>
-    <p:tnLst>
-      <p:par>
-        <p:cTn id="1" dur="indefinite" restart="never" nodeType="tmRoot"/>
-      </p:par>
-    </p:tnLst>
-  </p:timing>
 </p:sld>
 </file>
 
-<file path=ppt/slides/slide6.xml><?xml version="1.0" encoding="utf-8"?>
+<file path=ppt/slides/slide7.xml><?xml version="1.0" encoding="utf-8"?>
 <p:sld xmlns:a="http://schemas.openxmlformats.org/drawingml/2006/main" xmlns:r="http://schemas.openxmlformats.org/officeDocument/2006/relationships" xmlns:p="http://schemas.openxmlformats.org/presentationml/2006/main">
   <p:cSld>
     <p:spTree>
@@ -17405,7 +17574,7 @@
           <a:lstStyle/>
           <a:p>
             <a:r>
-              <a:rPr lang="en-US" altLang="zh-TW" dirty="0" smtClean="0"/>
+              <a:rPr lang="en-US" altLang="zh-TW" dirty="0"/>
               <a:t>Control off-chip peripherals</a:t>
             </a:r>
             <a:endParaRPr lang="zh-TW" altLang="en-US" dirty="0"/>
@@ -17433,13 +17602,13 @@
           <a:lstStyle/>
           <a:p>
             <a:r>
-              <a:rPr lang="en-US" altLang="zh-TW" sz="2800" dirty="0" smtClean="0"/>
+              <a:rPr lang="en-US" altLang="zh-TW" sz="2800" dirty="0"/>
               <a:t>Transfer command/data through off-chip buses</a:t>
             </a:r>
           </a:p>
           <a:p>
             <a:r>
-              <a:rPr lang="en-US" altLang="zh-TW" sz="2800" dirty="0" smtClean="0"/>
+              <a:rPr lang="en-US" altLang="zh-TW" sz="2800" dirty="0"/>
               <a:t>Following some protocol (waveform)</a:t>
             </a:r>
             <a:endParaRPr lang="zh-TW" altLang="en-US" sz="2800" dirty="0"/>
@@ -17504,17 +17673,10 @@
   <p:clrMapOvr>
     <a:masterClrMapping/>
   </p:clrMapOvr>
-  <p:timing>
-    <p:tnLst>
-      <p:par>
-        <p:cTn id="1" dur="indefinite" restart="never" nodeType="tmRoot"/>
-      </p:par>
-    </p:tnLst>
-  </p:timing>
 </p:sld>
 </file>
 
-<file path=ppt/slides/slide7.xml><?xml version="1.0" encoding="utf-8"?>
+<file path=ppt/slides/slide8.xml><?xml version="1.0" encoding="utf-8"?>
 <p:sld xmlns:a="http://schemas.openxmlformats.org/drawingml/2006/main" xmlns:r="http://schemas.openxmlformats.org/officeDocument/2006/relationships" xmlns:p="http://schemas.openxmlformats.org/presentationml/2006/main">
   <p:cSld>
     <p:spTree>
@@ -17547,7 +17709,7 @@
           <a:lstStyle/>
           <a:p>
             <a:r>
-              <a:rPr lang="en-US" altLang="zh-TW" dirty="0" smtClean="0"/>
+              <a:rPr lang="en-US" altLang="zh-TW" dirty="0"/>
               <a:t>Control the LCD Display</a:t>
             </a:r>
             <a:endParaRPr lang="zh-TW" altLang="en-US" dirty="0"/>
@@ -17570,7 +17732,7 @@
           <a:lstStyle/>
           <a:p>
             <a:r>
-              <a:rPr lang="en-US" altLang="zh-TW" dirty="0" smtClean="0"/>
+              <a:rPr lang="en-US" altLang="zh-TW" dirty="0"/>
               <a:t>From the hardware perspective</a:t>
             </a:r>
             <a:endParaRPr lang="zh-TW" altLang="en-US" dirty="0"/>
@@ -17587,17 +17749,10 @@
   <p:clrMapOvr>
     <a:masterClrMapping/>
   </p:clrMapOvr>
-  <p:timing>
-    <p:tnLst>
-      <p:par>
-        <p:cTn id="1" dur="indefinite" restart="never" nodeType="tmRoot"/>
-      </p:par>
-    </p:tnLst>
-  </p:timing>
 </p:sld>
 </file>
 
-<file path=ppt/slides/slide8.xml><?xml version="1.0" encoding="utf-8"?>
+<file path=ppt/slides/slide9.xml><?xml version="1.0" encoding="utf-8"?>
 <p:sld xmlns:a="http://schemas.openxmlformats.org/drawingml/2006/main" xmlns:r="http://schemas.openxmlformats.org/officeDocument/2006/relationships" xmlns:p="http://schemas.openxmlformats.org/presentationml/2006/main">
   <p:cSld>
     <p:spTree>
@@ -17630,7 +17785,7 @@
           <a:lstStyle/>
           <a:p>
             <a:r>
-              <a:rPr lang="en-US" altLang="zh-TW" dirty="0" smtClean="0"/>
+              <a:rPr lang="en-US" altLang="zh-TW" dirty="0"/>
               <a:t>Signal Interface to the LCD</a:t>
             </a:r>
             <a:endParaRPr lang="zh-TW" altLang="en-US" dirty="0"/>
@@ -17737,193 +17892,6 @@
   <p:clrMapOvr>
     <a:masterClrMapping/>
   </p:clrMapOvr>
-  <p:timing>
-    <p:tnLst>
-      <p:par>
-        <p:cTn id="1" dur="indefinite" restart="never" nodeType="tmRoot"/>
-      </p:par>
-    </p:tnLst>
-  </p:timing>
-</p:sld>
-</file>
-
-<file path=ppt/slides/slide9.xml><?xml version="1.0" encoding="utf-8"?>
-<p:sld xmlns:a="http://schemas.openxmlformats.org/drawingml/2006/main" xmlns:r="http://schemas.openxmlformats.org/officeDocument/2006/relationships" xmlns:p="http://schemas.openxmlformats.org/presentationml/2006/main">
-  <p:cSld>
-    <p:spTree>
-      <p:nvGrpSpPr>
-        <p:cNvPr id="1" name=""/>
-        <p:cNvGrpSpPr/>
-        <p:nvPr/>
-      </p:nvGrpSpPr>
-      <p:grpSpPr>
-        <a:xfrm>
-          <a:off x="0" y="0"/>
-          <a:ext cx="0" cy="0"/>
-          <a:chOff x="0" y="0"/>
-          <a:chExt cx="0" cy="0"/>
-        </a:xfrm>
-      </p:grpSpPr>
-      <p:sp>
-        <p:nvSpPr>
-          <p:cNvPr id="2" name="標題 1"/>
-          <p:cNvSpPr>
-            <a:spLocks noGrp="1"/>
-          </p:cNvSpPr>
-          <p:nvPr>
-            <p:ph type="title"/>
-          </p:nvPr>
-        </p:nvSpPr>
-        <p:spPr/>
-        <p:txBody>
-          <a:bodyPr/>
-          <a:lstStyle/>
-          <a:p>
-            <a:r>
-              <a:rPr lang="en-US" altLang="zh-TW" dirty="0" smtClean="0"/>
-              <a:t>Signal interface to the LCD</a:t>
-            </a:r>
-            <a:endParaRPr lang="zh-TW" altLang="en-US" dirty="0"/>
-          </a:p>
-        </p:txBody>
-      </p:sp>
-      <p:sp>
-        <p:nvSpPr>
-          <p:cNvPr id="3" name="內容版面配置區 2"/>
-          <p:cNvSpPr>
-            <a:spLocks noGrp="1"/>
-          </p:cNvSpPr>
-          <p:nvPr>
-            <p:ph idx="1"/>
-          </p:nvPr>
-        </p:nvSpPr>
-        <p:spPr>
-          <a:xfrm>
-            <a:off x="590843" y="2017713"/>
-            <a:ext cx="3709182" cy="4341054"/>
-          </a:xfrm>
-        </p:spPr>
-        <p:txBody>
-          <a:bodyPr/>
-          <a:lstStyle/>
-          <a:p>
-            <a:r>
-              <a:rPr lang="en-US" altLang="zh-TW" sz="2000" dirty="0"/>
-              <a:t>RS: register select</a:t>
-            </a:r>
-          </a:p>
-          <a:p>
-            <a:pPr lvl="1"/>
-            <a:r>
-              <a:rPr lang="en-US" altLang="zh-TW" sz="1800" dirty="0"/>
-              <a:t>0: command</a:t>
-            </a:r>
-          </a:p>
-          <a:p>
-            <a:pPr lvl="1"/>
-            <a:r>
-              <a:rPr lang="en-US" altLang="zh-TW" sz="1800" dirty="0"/>
-              <a:t>1: data</a:t>
-            </a:r>
-          </a:p>
-          <a:p>
-            <a:r>
-              <a:rPr lang="en-US" altLang="zh-TW" sz="2000" dirty="0"/>
-              <a:t>E: latch enable</a:t>
-            </a:r>
-          </a:p>
-          <a:p>
-            <a:pPr lvl="1"/>
-            <a:r>
-              <a:rPr lang="en-US" altLang="zh-TW" sz="1800" dirty="0"/>
-              <a:t>the LCD latches the command/data at negative edge (1</a:t>
-            </a:r>
-            <a:r>
-              <a:rPr lang="en-US" altLang="zh-TW" sz="1800" dirty="0">
-                <a:sym typeface="Wingdings" panose="05000000000000000000" pitchFamily="2" charset="2"/>
-              </a:rPr>
-              <a:t>0)</a:t>
-            </a:r>
-          </a:p>
-          <a:p>
-            <a:r>
-              <a:rPr lang="en-US" altLang="zh-TW" sz="2000" dirty="0">
-                <a:sym typeface="Wingdings" panose="05000000000000000000" pitchFamily="2" charset="2"/>
-              </a:rPr>
-              <a:t>D [7:0]</a:t>
-            </a:r>
-          </a:p>
-          <a:p>
-            <a:pPr lvl="1"/>
-            <a:r>
-              <a:rPr lang="en-US" altLang="zh-TW" sz="1800" dirty="0">
-                <a:sym typeface="Wingdings" panose="05000000000000000000" pitchFamily="2" charset="2"/>
-              </a:rPr>
-              <a:t>the 8-bit data/command</a:t>
-            </a:r>
-          </a:p>
-          <a:p>
-            <a:pPr lvl="1"/>
-            <a:r>
-              <a:rPr lang="en-US" altLang="zh-TW" sz="1800" dirty="0">
-                <a:sym typeface="Wingdings" panose="05000000000000000000" pitchFamily="2" charset="2"/>
-              </a:rPr>
-              <a:t>configured 4-bit mode</a:t>
-            </a:r>
-          </a:p>
-          <a:p>
-            <a:pPr lvl="1"/>
-            <a:r>
-              <a:rPr lang="en-US" altLang="zh-TW" sz="1800" dirty="0">
-                <a:sym typeface="Wingdings" panose="05000000000000000000" pitchFamily="2" charset="2"/>
-              </a:rPr>
-              <a:t>send higher portion first</a:t>
-            </a:r>
-            <a:endParaRPr lang="zh-TW" altLang="en-US" sz="1800" dirty="0"/>
-          </a:p>
-        </p:txBody>
-      </p:sp>
-      <p:pic>
-        <p:nvPicPr>
-          <p:cNvPr id="4" name="圖片 3"/>
-          <p:cNvPicPr>
-            <a:picLocks noChangeAspect="1"/>
-          </p:cNvPicPr>
-          <p:nvPr/>
-        </p:nvPicPr>
-        <p:blipFill>
-          <a:blip r:embed="rId2"/>
-          <a:stretch>
-            <a:fillRect/>
-          </a:stretch>
-        </p:blipFill>
-        <p:spPr>
-          <a:xfrm>
-            <a:off x="3967090" y="2810836"/>
-            <a:ext cx="5176910" cy="3224373"/>
-          </a:xfrm>
-          <a:prstGeom prst="rect">
-            <a:avLst/>
-          </a:prstGeom>
-        </p:spPr>
-      </p:pic>
-    </p:spTree>
-    <p:extLst>
-      <p:ext uri="{BB962C8B-B14F-4D97-AF65-F5344CB8AC3E}">
-        <p14:creationId xmlns:p14="http://schemas.microsoft.com/office/powerpoint/2010/main" val="3504983280"/>
-      </p:ext>
-    </p:extLst>
-  </p:cSld>
-  <p:clrMapOvr>
-    <a:masterClrMapping/>
-  </p:clrMapOvr>
-  <p:timing>
-    <p:tnLst>
-      <p:par>
-        <p:cTn id="1" dur="indefinite" restart="never" nodeType="tmRoot"/>
-      </p:par>
-    </p:tnLst>
-  </p:timing>
 </p:sld>
 </file>
 

</xml_diff>